<commit_message>
added more slides to PPT
</commit_message>
<xml_diff>
--- a/Delaunay-Rips_Paper/Computation_of_Persistent_Homology_Presentation.pptx
+++ b/Delaunay-Rips_Paper/Computation_of_Persistent_Homology_Presentation.pptx
@@ -4,14 +4,45 @@
   <p:sldMasterIdLst>
     <p:sldMasterId id="2147483648" r:id="rId1"/>
   </p:sldMasterIdLst>
+  <p:notesMasterIdLst>
+    <p:notesMasterId r:id="rId37"/>
+  </p:notesMasterIdLst>
   <p:sldIdLst>
     <p:sldId id="256" r:id="rId2"/>
-    <p:sldId id="257" r:id="rId3"/>
-    <p:sldId id="258" r:id="rId4"/>
-    <p:sldId id="259" r:id="rId5"/>
-    <p:sldId id="260" r:id="rId6"/>
-    <p:sldId id="261" r:id="rId7"/>
-    <p:sldId id="262" r:id="rId8"/>
+    <p:sldId id="264" r:id="rId3"/>
+    <p:sldId id="263" r:id="rId4"/>
+    <p:sldId id="288" r:id="rId5"/>
+    <p:sldId id="257" r:id="rId6"/>
+    <p:sldId id="258" r:id="rId7"/>
+    <p:sldId id="259" r:id="rId8"/>
+    <p:sldId id="260" r:id="rId9"/>
+    <p:sldId id="261" r:id="rId10"/>
+    <p:sldId id="262" r:id="rId11"/>
+    <p:sldId id="265" r:id="rId12"/>
+    <p:sldId id="266" r:id="rId13"/>
+    <p:sldId id="267" r:id="rId14"/>
+    <p:sldId id="271" r:id="rId15"/>
+    <p:sldId id="268" r:id="rId16"/>
+    <p:sldId id="269" r:id="rId17"/>
+    <p:sldId id="270" r:id="rId18"/>
+    <p:sldId id="289" r:id="rId19"/>
+    <p:sldId id="290" r:id="rId20"/>
+    <p:sldId id="272" r:id="rId21"/>
+    <p:sldId id="273" r:id="rId22"/>
+    <p:sldId id="274" r:id="rId23"/>
+    <p:sldId id="276" r:id="rId24"/>
+    <p:sldId id="275" r:id="rId25"/>
+    <p:sldId id="277" r:id="rId26"/>
+    <p:sldId id="278" r:id="rId27"/>
+    <p:sldId id="279" r:id="rId28"/>
+    <p:sldId id="280" r:id="rId29"/>
+    <p:sldId id="283" r:id="rId30"/>
+    <p:sldId id="281" r:id="rId31"/>
+    <p:sldId id="282" r:id="rId32"/>
+    <p:sldId id="284" r:id="rId33"/>
+    <p:sldId id="285" r:id="rId34"/>
+    <p:sldId id="286" r:id="rId35"/>
+    <p:sldId id="287" r:id="rId36"/>
   </p:sldIdLst>
   <p:sldSz cx="12192000" cy="6858000"/>
   <p:notesSz cx="6858000" cy="9144000"/>
@@ -120,21 +151,717 @@
         </p14:section>
         <p14:section name="Intro" id="{95FB775C-0602-46D5-B228-E4C41EC740F1}">
           <p14:sldIdLst>
+            <p14:sldId id="264"/>
+            <p14:sldId id="263"/>
+            <p14:sldId id="288"/>
             <p14:sldId id="257"/>
             <p14:sldId id="258"/>
             <p14:sldId id="259"/>
             <p14:sldId id="260"/>
             <p14:sldId id="261"/>
             <p14:sldId id="262"/>
+            <p14:sldId id="265"/>
           </p14:sldIdLst>
         </p14:section>
         <p14:section name="Level 1" id="{B0CD5AF2-FD3E-4AAB-9A26-732FC7870CCD}">
-          <p14:sldIdLst/>
+          <p14:sldIdLst>
+            <p14:sldId id="266"/>
+            <p14:sldId id="267"/>
+            <p14:sldId id="271"/>
+            <p14:sldId id="268"/>
+            <p14:sldId id="269"/>
+            <p14:sldId id="270"/>
+            <p14:sldId id="289"/>
+            <p14:sldId id="290"/>
+          </p14:sldIdLst>
+        </p14:section>
+        <p14:section name="Level 2" id="{D6144C49-3029-4AB9-B3AC-C63FADA9D464}">
+          <p14:sldIdLst>
+            <p14:sldId id="272"/>
+            <p14:sldId id="273"/>
+            <p14:sldId id="274"/>
+            <p14:sldId id="276"/>
+            <p14:sldId id="275"/>
+          </p14:sldIdLst>
+        </p14:section>
+        <p14:section name="Level 3" id="{7A8C169F-DCDA-422F-A63C-BC0C96076777}">
+          <p14:sldIdLst>
+            <p14:sldId id="277"/>
+            <p14:sldId id="278"/>
+            <p14:sldId id="279"/>
+            <p14:sldId id="280"/>
+          </p14:sldIdLst>
+        </p14:section>
+        <p14:section name="Future Work" id="{B91973A3-B28B-4328-8A57-2BE1CB27C4AC}">
+          <p14:sldIdLst>
+            <p14:sldId id="283"/>
+            <p14:sldId id="281"/>
+            <p14:sldId id="282"/>
+          </p14:sldIdLst>
+        </p14:section>
+        <p14:section name="Acknowledgements" id="{75DEEDAA-0735-41FD-892A-9767229B80D8}">
+          <p14:sldIdLst>
+            <p14:sldId id="284"/>
+            <p14:sldId id="285"/>
+            <p14:sldId id="286"/>
+            <p14:sldId id="287"/>
+          </p14:sldIdLst>
         </p14:section>
       </p14:sectionLst>
     </p:ext>
+    <p:ext uri="{EFAFB233-063F-42B5-8137-9DF3F51BA10A}">
+      <p15:sldGuideLst xmlns:p15="http://schemas.microsoft.com/office/powerpoint/2012/main"/>
+    </p:ext>
   </p:extLst>
 </p:presentation>
+</file>
+
+<file path=ppt/notesMasters/notesMaster1.xml><?xml version="1.0" encoding="utf-8"?>
+<p:notesMaster xmlns:a="http://schemas.openxmlformats.org/drawingml/2006/main" xmlns:r="http://schemas.openxmlformats.org/officeDocument/2006/relationships" xmlns:p="http://schemas.openxmlformats.org/presentationml/2006/main">
+  <p:cSld>
+    <p:bg>
+      <p:bgRef idx="1001">
+        <a:schemeClr val="bg1"/>
+      </p:bgRef>
+    </p:bg>
+    <p:spTree>
+      <p:nvGrpSpPr>
+        <p:cNvPr id="1" name=""/>
+        <p:cNvGrpSpPr/>
+        <p:nvPr/>
+      </p:nvGrpSpPr>
+      <p:grpSpPr>
+        <a:xfrm>
+          <a:off x="0" y="0"/>
+          <a:ext cx="0" cy="0"/>
+          <a:chOff x="0" y="0"/>
+          <a:chExt cx="0" cy="0"/>
+        </a:xfrm>
+      </p:grpSpPr>
+      <p:sp>
+        <p:nvSpPr>
+          <p:cNvPr id="2" name="Header Placeholder 1"/>
+          <p:cNvSpPr>
+            <a:spLocks noGrp="1"/>
+          </p:cNvSpPr>
+          <p:nvPr>
+            <p:ph type="hdr" sz="quarter"/>
+          </p:nvPr>
+        </p:nvSpPr>
+        <p:spPr>
+          <a:xfrm>
+            <a:off x="0" y="0"/>
+            <a:ext cx="2971800" cy="458788"/>
+          </a:xfrm>
+          <a:prstGeom prst="rect">
+            <a:avLst/>
+          </a:prstGeom>
+        </p:spPr>
+        <p:txBody>
+          <a:bodyPr vert="horz" lIns="91440" tIns="45720" rIns="91440" bIns="45720" rtlCol="0"/>
+          <a:lstStyle>
+            <a:lvl1pPr algn="l">
+              <a:defRPr sz="1200"/>
+            </a:lvl1pPr>
+          </a:lstStyle>
+          <a:p>
+            <a:endParaRPr lang="en-US"/>
+          </a:p>
+        </p:txBody>
+      </p:sp>
+      <p:sp>
+        <p:nvSpPr>
+          <p:cNvPr id="3" name="Date Placeholder 2"/>
+          <p:cNvSpPr>
+            <a:spLocks noGrp="1"/>
+          </p:cNvSpPr>
+          <p:nvPr>
+            <p:ph type="dt" idx="1"/>
+          </p:nvPr>
+        </p:nvSpPr>
+        <p:spPr>
+          <a:xfrm>
+            <a:off x="3884613" y="0"/>
+            <a:ext cx="2971800" cy="458788"/>
+          </a:xfrm>
+          <a:prstGeom prst="rect">
+            <a:avLst/>
+          </a:prstGeom>
+        </p:spPr>
+        <p:txBody>
+          <a:bodyPr vert="horz" lIns="91440" tIns="45720" rIns="91440" bIns="45720" rtlCol="0"/>
+          <a:lstStyle>
+            <a:lvl1pPr algn="r">
+              <a:defRPr sz="1200"/>
+            </a:lvl1pPr>
+          </a:lstStyle>
+          <a:p>
+            <a:fld id="{DD5D0A23-E9BF-45AE-9B43-FE6137ACD329}" type="datetimeFigureOut">
+              <a:rPr lang="en-US" smtClean="0"/>
+              <a:t>10/19/2021</a:t>
+            </a:fld>
+            <a:endParaRPr lang="en-US"/>
+          </a:p>
+        </p:txBody>
+      </p:sp>
+      <p:sp>
+        <p:nvSpPr>
+          <p:cNvPr id="4" name="Slide Image Placeholder 3"/>
+          <p:cNvSpPr>
+            <a:spLocks noGrp="1" noRot="1" noChangeAspect="1"/>
+          </p:cNvSpPr>
+          <p:nvPr>
+            <p:ph type="sldImg" idx="2"/>
+          </p:nvPr>
+        </p:nvSpPr>
+        <p:spPr>
+          <a:xfrm>
+            <a:off x="685800" y="1143000"/>
+            <a:ext cx="5486400" cy="3086100"/>
+          </a:xfrm>
+          <a:prstGeom prst="rect">
+            <a:avLst/>
+          </a:prstGeom>
+          <a:noFill/>
+          <a:ln w="12700">
+            <a:solidFill>
+              <a:prstClr val="black"/>
+            </a:solidFill>
+          </a:ln>
+        </p:spPr>
+        <p:txBody>
+          <a:bodyPr vert="horz" lIns="91440" tIns="45720" rIns="91440" bIns="45720" rtlCol="0" anchor="ctr"/>
+          <a:lstStyle/>
+          <a:p>
+            <a:endParaRPr lang="en-US"/>
+          </a:p>
+        </p:txBody>
+      </p:sp>
+      <p:sp>
+        <p:nvSpPr>
+          <p:cNvPr id="5" name="Notes Placeholder 4"/>
+          <p:cNvSpPr>
+            <a:spLocks noGrp="1"/>
+          </p:cNvSpPr>
+          <p:nvPr>
+            <p:ph type="body" sz="quarter" idx="3"/>
+          </p:nvPr>
+        </p:nvSpPr>
+        <p:spPr>
+          <a:xfrm>
+            <a:off x="685800" y="4400550"/>
+            <a:ext cx="5486400" cy="3600450"/>
+          </a:xfrm>
+          <a:prstGeom prst="rect">
+            <a:avLst/>
+          </a:prstGeom>
+        </p:spPr>
+        <p:txBody>
+          <a:bodyPr vert="horz" lIns="91440" tIns="45720" rIns="91440" bIns="45720" rtlCol="0"/>
+          <a:lstStyle/>
+          <a:p>
+            <a:pPr lvl="0"/>
+            <a:r>
+              <a:rPr lang="en-US"/>
+              <a:t>Click to edit Master text styles</a:t>
+            </a:r>
+          </a:p>
+          <a:p>
+            <a:pPr lvl="1"/>
+            <a:r>
+              <a:rPr lang="en-US"/>
+              <a:t>Second level</a:t>
+            </a:r>
+          </a:p>
+          <a:p>
+            <a:pPr lvl="2"/>
+            <a:r>
+              <a:rPr lang="en-US"/>
+              <a:t>Third level</a:t>
+            </a:r>
+          </a:p>
+          <a:p>
+            <a:pPr lvl="3"/>
+            <a:r>
+              <a:rPr lang="en-US"/>
+              <a:t>Fourth level</a:t>
+            </a:r>
+          </a:p>
+          <a:p>
+            <a:pPr lvl="4"/>
+            <a:r>
+              <a:rPr lang="en-US"/>
+              <a:t>Fifth level</a:t>
+            </a:r>
+          </a:p>
+        </p:txBody>
+      </p:sp>
+      <p:sp>
+        <p:nvSpPr>
+          <p:cNvPr id="6" name="Footer Placeholder 5"/>
+          <p:cNvSpPr>
+            <a:spLocks noGrp="1"/>
+          </p:cNvSpPr>
+          <p:nvPr>
+            <p:ph type="ftr" sz="quarter" idx="4"/>
+          </p:nvPr>
+        </p:nvSpPr>
+        <p:spPr>
+          <a:xfrm>
+            <a:off x="0" y="8685213"/>
+            <a:ext cx="2971800" cy="458787"/>
+          </a:xfrm>
+          <a:prstGeom prst="rect">
+            <a:avLst/>
+          </a:prstGeom>
+        </p:spPr>
+        <p:txBody>
+          <a:bodyPr vert="horz" lIns="91440" tIns="45720" rIns="91440" bIns="45720" rtlCol="0" anchor="b"/>
+          <a:lstStyle>
+            <a:lvl1pPr algn="l">
+              <a:defRPr sz="1200"/>
+            </a:lvl1pPr>
+          </a:lstStyle>
+          <a:p>
+            <a:endParaRPr lang="en-US"/>
+          </a:p>
+        </p:txBody>
+      </p:sp>
+      <p:sp>
+        <p:nvSpPr>
+          <p:cNvPr id="7" name="Slide Number Placeholder 6"/>
+          <p:cNvSpPr>
+            <a:spLocks noGrp="1"/>
+          </p:cNvSpPr>
+          <p:nvPr>
+            <p:ph type="sldNum" sz="quarter" idx="5"/>
+          </p:nvPr>
+        </p:nvSpPr>
+        <p:spPr>
+          <a:xfrm>
+            <a:off x="3884613" y="8685213"/>
+            <a:ext cx="2971800" cy="458787"/>
+          </a:xfrm>
+          <a:prstGeom prst="rect">
+            <a:avLst/>
+          </a:prstGeom>
+        </p:spPr>
+        <p:txBody>
+          <a:bodyPr vert="horz" lIns="91440" tIns="45720" rIns="91440" bIns="45720" rtlCol="0" anchor="b"/>
+          <a:lstStyle>
+            <a:lvl1pPr algn="r">
+              <a:defRPr sz="1200"/>
+            </a:lvl1pPr>
+          </a:lstStyle>
+          <a:p>
+            <a:fld id="{17245520-AA3C-489A-86A6-3327B1884568}" type="slidenum">
+              <a:rPr lang="en-US" smtClean="0"/>
+              <a:t>‹#›</a:t>
+            </a:fld>
+            <a:endParaRPr lang="en-US"/>
+          </a:p>
+        </p:txBody>
+      </p:sp>
+    </p:spTree>
+    <p:extLst>
+      <p:ext uri="{BB962C8B-B14F-4D97-AF65-F5344CB8AC3E}">
+        <p14:creationId xmlns:p14="http://schemas.microsoft.com/office/powerpoint/2010/main" val="2822705847"/>
+      </p:ext>
+    </p:extLst>
+  </p:cSld>
+  <p:clrMap bg1="lt1" tx1="dk1" bg2="lt2" tx2="dk2" accent1="accent1" accent2="accent2" accent3="accent3" accent4="accent4" accent5="accent5" accent6="accent6" hlink="hlink" folHlink="folHlink"/>
+  <p:notesStyle>
+    <a:lvl1pPr marL="0" algn="l" defTabSz="914400" rtl="0" eaLnBrk="1" latinLnBrk="0" hangingPunct="1">
+      <a:defRPr sz="1200" kern="1200">
+        <a:solidFill>
+          <a:schemeClr val="tx1"/>
+        </a:solidFill>
+        <a:latin typeface="+mn-lt"/>
+        <a:ea typeface="+mn-ea"/>
+        <a:cs typeface="+mn-cs"/>
+      </a:defRPr>
+    </a:lvl1pPr>
+    <a:lvl2pPr marL="457200" algn="l" defTabSz="914400" rtl="0" eaLnBrk="1" latinLnBrk="0" hangingPunct="1">
+      <a:defRPr sz="1200" kern="1200">
+        <a:solidFill>
+          <a:schemeClr val="tx1"/>
+        </a:solidFill>
+        <a:latin typeface="+mn-lt"/>
+        <a:ea typeface="+mn-ea"/>
+        <a:cs typeface="+mn-cs"/>
+      </a:defRPr>
+    </a:lvl2pPr>
+    <a:lvl3pPr marL="914400" algn="l" defTabSz="914400" rtl="0" eaLnBrk="1" latinLnBrk="0" hangingPunct="1">
+      <a:defRPr sz="1200" kern="1200">
+        <a:solidFill>
+          <a:schemeClr val="tx1"/>
+        </a:solidFill>
+        <a:latin typeface="+mn-lt"/>
+        <a:ea typeface="+mn-ea"/>
+        <a:cs typeface="+mn-cs"/>
+      </a:defRPr>
+    </a:lvl3pPr>
+    <a:lvl4pPr marL="1371600" algn="l" defTabSz="914400" rtl="0" eaLnBrk="1" latinLnBrk="0" hangingPunct="1">
+      <a:defRPr sz="1200" kern="1200">
+        <a:solidFill>
+          <a:schemeClr val="tx1"/>
+        </a:solidFill>
+        <a:latin typeface="+mn-lt"/>
+        <a:ea typeface="+mn-ea"/>
+        <a:cs typeface="+mn-cs"/>
+      </a:defRPr>
+    </a:lvl4pPr>
+    <a:lvl5pPr marL="1828800" algn="l" defTabSz="914400" rtl="0" eaLnBrk="1" latinLnBrk="0" hangingPunct="1">
+      <a:defRPr sz="1200" kern="1200">
+        <a:solidFill>
+          <a:schemeClr val="tx1"/>
+        </a:solidFill>
+        <a:latin typeface="+mn-lt"/>
+        <a:ea typeface="+mn-ea"/>
+        <a:cs typeface="+mn-cs"/>
+      </a:defRPr>
+    </a:lvl5pPr>
+    <a:lvl6pPr marL="2286000" algn="l" defTabSz="914400" rtl="0" eaLnBrk="1" latinLnBrk="0" hangingPunct="1">
+      <a:defRPr sz="1200" kern="1200">
+        <a:solidFill>
+          <a:schemeClr val="tx1"/>
+        </a:solidFill>
+        <a:latin typeface="+mn-lt"/>
+        <a:ea typeface="+mn-ea"/>
+        <a:cs typeface="+mn-cs"/>
+      </a:defRPr>
+    </a:lvl6pPr>
+    <a:lvl7pPr marL="2743200" algn="l" defTabSz="914400" rtl="0" eaLnBrk="1" latinLnBrk="0" hangingPunct="1">
+      <a:defRPr sz="1200" kern="1200">
+        <a:solidFill>
+          <a:schemeClr val="tx1"/>
+        </a:solidFill>
+        <a:latin typeface="+mn-lt"/>
+        <a:ea typeface="+mn-ea"/>
+        <a:cs typeface="+mn-cs"/>
+      </a:defRPr>
+    </a:lvl7pPr>
+    <a:lvl8pPr marL="3200400" algn="l" defTabSz="914400" rtl="0" eaLnBrk="1" latinLnBrk="0" hangingPunct="1">
+      <a:defRPr sz="1200" kern="1200">
+        <a:solidFill>
+          <a:schemeClr val="tx1"/>
+        </a:solidFill>
+        <a:latin typeface="+mn-lt"/>
+        <a:ea typeface="+mn-ea"/>
+        <a:cs typeface="+mn-cs"/>
+      </a:defRPr>
+    </a:lvl8pPr>
+    <a:lvl9pPr marL="3657600" algn="l" defTabSz="914400" rtl="0" eaLnBrk="1" latinLnBrk="0" hangingPunct="1">
+      <a:defRPr sz="1200" kern="1200">
+        <a:solidFill>
+          <a:schemeClr val="tx1"/>
+        </a:solidFill>
+        <a:latin typeface="+mn-lt"/>
+        <a:ea typeface="+mn-ea"/>
+        <a:cs typeface="+mn-cs"/>
+      </a:defRPr>
+    </a:lvl9pPr>
+  </p:notesStyle>
+</p:notesMaster>
+</file>
+
+<file path=ppt/notesSlides/notesSlide1.xml><?xml version="1.0" encoding="utf-8"?>
+<p:notes xmlns:a="http://schemas.openxmlformats.org/drawingml/2006/main" xmlns:r="http://schemas.openxmlformats.org/officeDocument/2006/relationships" xmlns:p="http://schemas.openxmlformats.org/presentationml/2006/main">
+  <p:cSld>
+    <p:spTree>
+      <p:nvGrpSpPr>
+        <p:cNvPr id="1" name=""/>
+        <p:cNvGrpSpPr/>
+        <p:nvPr/>
+      </p:nvGrpSpPr>
+      <p:grpSpPr>
+        <a:xfrm>
+          <a:off x="0" y="0"/>
+          <a:ext cx="0" cy="0"/>
+          <a:chOff x="0" y="0"/>
+          <a:chExt cx="0" cy="0"/>
+        </a:xfrm>
+      </p:grpSpPr>
+      <p:sp>
+        <p:nvSpPr>
+          <p:cNvPr id="2" name="Slide Image Placeholder 1"/>
+          <p:cNvSpPr>
+            <a:spLocks noGrp="1" noRot="1" noChangeAspect="1"/>
+          </p:cNvSpPr>
+          <p:nvPr>
+            <p:ph type="sldImg"/>
+          </p:nvPr>
+        </p:nvSpPr>
+        <p:spPr/>
+      </p:sp>
+      <p:sp>
+        <p:nvSpPr>
+          <p:cNvPr id="3" name="Notes Placeholder 2"/>
+          <p:cNvSpPr>
+            <a:spLocks noGrp="1"/>
+          </p:cNvSpPr>
+          <p:nvPr>
+            <p:ph type="body" idx="1"/>
+          </p:nvPr>
+        </p:nvSpPr>
+        <p:spPr/>
+        <p:txBody>
+          <a:bodyPr/>
+          <a:lstStyle/>
+          <a:p>
+            <a:pPr marL="0" marR="0" lvl="0" indent="0" algn="l" defTabSz="914400" rtl="0" eaLnBrk="1" fontAlgn="auto" latinLnBrk="0" hangingPunct="1">
+              <a:lnSpc>
+                <a:spcPct val="100000"/>
+              </a:lnSpc>
+              <a:spcBef>
+                <a:spcPts val="0"/>
+              </a:spcBef>
+              <a:spcAft>
+                <a:spcPts val="0"/>
+              </a:spcAft>
+              <a:buClrTx/>
+              <a:buSzTx/>
+              <a:buFontTx/>
+              <a:buNone/>
+              <a:tabLst/>
+              <a:defRPr/>
+            </a:pPr>
+            <a:r>
+              <a:rPr lang="en-US" dirty="0"/>
+              <a:t>Similar mean of x, y, sample variance of x and y, correlation, linear regression, R^2</a:t>
+            </a:r>
+          </a:p>
+          <a:p>
+            <a:endParaRPr lang="en-US" dirty="0"/>
+          </a:p>
+        </p:txBody>
+      </p:sp>
+      <p:sp>
+        <p:nvSpPr>
+          <p:cNvPr id="4" name="Slide Number Placeholder 3"/>
+          <p:cNvSpPr>
+            <a:spLocks noGrp="1"/>
+          </p:cNvSpPr>
+          <p:nvPr>
+            <p:ph type="sldNum" sz="quarter" idx="5"/>
+          </p:nvPr>
+        </p:nvSpPr>
+        <p:spPr/>
+        <p:txBody>
+          <a:bodyPr/>
+          <a:lstStyle/>
+          <a:p>
+            <a:fld id="{17245520-AA3C-489A-86A6-3327B1884568}" type="slidenum">
+              <a:rPr lang="en-US" smtClean="0"/>
+              <a:t>2</a:t>
+            </a:fld>
+            <a:endParaRPr lang="en-US"/>
+          </a:p>
+        </p:txBody>
+      </p:sp>
+    </p:spTree>
+    <p:extLst>
+      <p:ext uri="{BB962C8B-B14F-4D97-AF65-F5344CB8AC3E}">
+        <p14:creationId xmlns:p14="http://schemas.microsoft.com/office/powerpoint/2010/main" val="3195898090"/>
+      </p:ext>
+    </p:extLst>
+  </p:cSld>
+  <p:clrMapOvr>
+    <a:masterClrMapping/>
+  </p:clrMapOvr>
+</p:notes>
+</file>
+
+<file path=ppt/notesSlides/notesSlide2.xml><?xml version="1.0" encoding="utf-8"?>
+<p:notes xmlns:a="http://schemas.openxmlformats.org/drawingml/2006/main" xmlns:r="http://schemas.openxmlformats.org/officeDocument/2006/relationships" xmlns:p="http://schemas.openxmlformats.org/presentationml/2006/main">
+  <p:cSld>
+    <p:spTree>
+      <p:nvGrpSpPr>
+        <p:cNvPr id="1" name=""/>
+        <p:cNvGrpSpPr/>
+        <p:nvPr/>
+      </p:nvGrpSpPr>
+      <p:grpSpPr>
+        <a:xfrm>
+          <a:off x="0" y="0"/>
+          <a:ext cx="0" cy="0"/>
+          <a:chOff x="0" y="0"/>
+          <a:chExt cx="0" cy="0"/>
+        </a:xfrm>
+      </p:grpSpPr>
+      <p:sp>
+        <p:nvSpPr>
+          <p:cNvPr id="2" name="Slide Image Placeholder 1"/>
+          <p:cNvSpPr>
+            <a:spLocks noGrp="1" noRot="1" noChangeAspect="1"/>
+          </p:cNvSpPr>
+          <p:nvPr>
+            <p:ph type="sldImg"/>
+          </p:nvPr>
+        </p:nvSpPr>
+        <p:spPr/>
+      </p:sp>
+      <p:sp>
+        <p:nvSpPr>
+          <p:cNvPr id="3" name="Notes Placeholder 2"/>
+          <p:cNvSpPr>
+            <a:spLocks noGrp="1"/>
+          </p:cNvSpPr>
+          <p:nvPr>
+            <p:ph type="body" idx="1"/>
+          </p:nvPr>
+        </p:nvSpPr>
+        <p:spPr/>
+        <p:txBody>
+          <a:bodyPr/>
+          <a:lstStyle/>
+          <a:p>
+            <a:r>
+              <a:rPr lang="en-US" dirty="0"/>
+              <a:t>https://www.autodesk.com/research/publications/same-stats-different-graphs</a:t>
+            </a:r>
+          </a:p>
+        </p:txBody>
+      </p:sp>
+      <p:sp>
+        <p:nvSpPr>
+          <p:cNvPr id="4" name="Slide Number Placeholder 3"/>
+          <p:cNvSpPr>
+            <a:spLocks noGrp="1"/>
+          </p:cNvSpPr>
+          <p:nvPr>
+            <p:ph type="sldNum" sz="quarter" idx="5"/>
+          </p:nvPr>
+        </p:nvSpPr>
+        <p:spPr/>
+        <p:txBody>
+          <a:bodyPr/>
+          <a:lstStyle/>
+          <a:p>
+            <a:fld id="{17245520-AA3C-489A-86A6-3327B1884568}" type="slidenum">
+              <a:rPr lang="en-US" smtClean="0"/>
+              <a:t>3</a:t>
+            </a:fld>
+            <a:endParaRPr lang="en-US"/>
+          </a:p>
+        </p:txBody>
+      </p:sp>
+    </p:spTree>
+    <p:extLst>
+      <p:ext uri="{BB962C8B-B14F-4D97-AF65-F5344CB8AC3E}">
+        <p14:creationId xmlns:p14="http://schemas.microsoft.com/office/powerpoint/2010/main" val="227945400"/>
+      </p:ext>
+    </p:extLst>
+  </p:cSld>
+  <p:clrMapOvr>
+    <a:masterClrMapping/>
+  </p:clrMapOvr>
+</p:notes>
+</file>
+
+<file path=ppt/notesSlides/notesSlide3.xml><?xml version="1.0" encoding="utf-8"?>
+<p:notes xmlns:a="http://schemas.openxmlformats.org/drawingml/2006/main" xmlns:r="http://schemas.openxmlformats.org/officeDocument/2006/relationships" xmlns:p="http://schemas.openxmlformats.org/presentationml/2006/main">
+  <p:cSld>
+    <p:spTree>
+      <p:nvGrpSpPr>
+        <p:cNvPr id="1" name=""/>
+        <p:cNvGrpSpPr/>
+        <p:nvPr/>
+      </p:nvGrpSpPr>
+      <p:grpSpPr>
+        <a:xfrm>
+          <a:off x="0" y="0"/>
+          <a:ext cx="0" cy="0"/>
+          <a:chOff x="0" y="0"/>
+          <a:chExt cx="0" cy="0"/>
+        </a:xfrm>
+      </p:grpSpPr>
+      <p:sp>
+        <p:nvSpPr>
+          <p:cNvPr id="2" name="Slide Image Placeholder 1"/>
+          <p:cNvSpPr>
+            <a:spLocks noGrp="1" noRot="1" noChangeAspect="1"/>
+          </p:cNvSpPr>
+          <p:nvPr>
+            <p:ph type="sldImg"/>
+          </p:nvPr>
+        </p:nvSpPr>
+        <p:spPr/>
+      </p:sp>
+      <p:sp>
+        <p:nvSpPr>
+          <p:cNvPr id="3" name="Notes Placeholder 2"/>
+          <p:cNvSpPr>
+            <a:spLocks noGrp="1"/>
+          </p:cNvSpPr>
+          <p:nvPr>
+            <p:ph type="body" idx="1"/>
+          </p:nvPr>
+        </p:nvSpPr>
+        <p:spPr/>
+        <p:txBody>
+          <a:bodyPr/>
+          <a:lstStyle/>
+          <a:p>
+            <a:r>
+              <a:rPr lang="en-US" dirty="0" err="1">
+                <a:effectLst/>
+                <a:latin typeface="Arial" panose="020B0604020202020204" pitchFamily="34" charset="0"/>
+              </a:rPr>
+              <a:t>PersGNN</a:t>
+            </a:r>
+            <a:r>
+              <a:rPr lang="en-US" dirty="0">
+                <a:effectLst/>
+                <a:latin typeface="Arial" panose="020B0604020202020204" pitchFamily="34" charset="0"/>
+              </a:rPr>
+              <a:t> </a:t>
+            </a:r>
+            <a:r>
+              <a:rPr lang="en-US">
+                <a:effectLst/>
+                <a:latin typeface="Arial" panose="020B0604020202020204" pitchFamily="34" charset="0"/>
+              </a:rPr>
+              <a:t>Krishnapriyan</a:t>
+            </a:r>
+            <a:endParaRPr lang="en-US"/>
+          </a:p>
+        </p:txBody>
+      </p:sp>
+      <p:sp>
+        <p:nvSpPr>
+          <p:cNvPr id="4" name="Slide Number Placeholder 3"/>
+          <p:cNvSpPr>
+            <a:spLocks noGrp="1"/>
+          </p:cNvSpPr>
+          <p:nvPr>
+            <p:ph type="sldNum" sz="quarter" idx="5"/>
+          </p:nvPr>
+        </p:nvSpPr>
+        <p:spPr/>
+        <p:txBody>
+          <a:bodyPr/>
+          <a:lstStyle/>
+          <a:p>
+            <a:fld id="{17245520-AA3C-489A-86A6-3327B1884568}" type="slidenum">
+              <a:rPr lang="en-US" smtClean="0"/>
+              <a:t>6</a:t>
+            </a:fld>
+            <a:endParaRPr lang="en-US"/>
+          </a:p>
+        </p:txBody>
+      </p:sp>
+    </p:spTree>
+    <p:extLst>
+      <p:ext uri="{BB962C8B-B14F-4D97-AF65-F5344CB8AC3E}">
+        <p14:creationId xmlns:p14="http://schemas.microsoft.com/office/powerpoint/2010/main" val="2444694853"/>
+      </p:ext>
+    </p:extLst>
+  </p:cSld>
+  <p:clrMapOvr>
+    <a:masterClrMapping/>
+  </p:clrMapOvr>
+</p:notes>
 </file>
 
 <file path=ppt/slideLayouts/slideLayout1.xml><?xml version="1.0" encoding="utf-8"?>
@@ -284,7 +1011,7 @@
           <a:p>
             <a:fld id="{F127BA44-DA6A-4D35-B15C-91318AE39EDA}" type="datetimeFigureOut">
               <a:rPr lang="en-US" smtClean="0"/>
-              <a:t>10/18/2021</a:t>
+              <a:t>10/19/2021</a:t>
             </a:fld>
             <a:endParaRPr lang="en-US"/>
           </a:p>
@@ -482,7 +1209,7 @@
           <a:p>
             <a:fld id="{F127BA44-DA6A-4D35-B15C-91318AE39EDA}" type="datetimeFigureOut">
               <a:rPr lang="en-US" smtClean="0"/>
-              <a:t>10/18/2021</a:t>
+              <a:t>10/19/2021</a:t>
             </a:fld>
             <a:endParaRPr lang="en-US"/>
           </a:p>
@@ -690,7 +1417,7 @@
           <a:p>
             <a:fld id="{F127BA44-DA6A-4D35-B15C-91318AE39EDA}" type="datetimeFigureOut">
               <a:rPr lang="en-US" smtClean="0"/>
-              <a:t>10/18/2021</a:t>
+              <a:t>10/19/2021</a:t>
             </a:fld>
             <a:endParaRPr lang="en-US"/>
           </a:p>
@@ -888,7 +1615,7 @@
           <a:p>
             <a:fld id="{F127BA44-DA6A-4D35-B15C-91318AE39EDA}" type="datetimeFigureOut">
               <a:rPr lang="en-US" smtClean="0"/>
-              <a:t>10/18/2021</a:t>
+              <a:t>10/19/2021</a:t>
             </a:fld>
             <a:endParaRPr lang="en-US"/>
           </a:p>
@@ -1163,7 +1890,7 @@
           <a:p>
             <a:fld id="{F127BA44-DA6A-4D35-B15C-91318AE39EDA}" type="datetimeFigureOut">
               <a:rPr lang="en-US" smtClean="0"/>
-              <a:t>10/18/2021</a:t>
+              <a:t>10/19/2021</a:t>
             </a:fld>
             <a:endParaRPr lang="en-US"/>
           </a:p>
@@ -1428,7 +2155,7 @@
           <a:p>
             <a:fld id="{F127BA44-DA6A-4D35-B15C-91318AE39EDA}" type="datetimeFigureOut">
               <a:rPr lang="en-US" smtClean="0"/>
-              <a:t>10/18/2021</a:t>
+              <a:t>10/19/2021</a:t>
             </a:fld>
             <a:endParaRPr lang="en-US"/>
           </a:p>
@@ -1840,7 +2567,7 @@
           <a:p>
             <a:fld id="{F127BA44-DA6A-4D35-B15C-91318AE39EDA}" type="datetimeFigureOut">
               <a:rPr lang="en-US" smtClean="0"/>
-              <a:t>10/18/2021</a:t>
+              <a:t>10/19/2021</a:t>
             </a:fld>
             <a:endParaRPr lang="en-US"/>
           </a:p>
@@ -1981,7 +2708,7 @@
           <a:p>
             <a:fld id="{F127BA44-DA6A-4D35-B15C-91318AE39EDA}" type="datetimeFigureOut">
               <a:rPr lang="en-US" smtClean="0"/>
-              <a:t>10/18/2021</a:t>
+              <a:t>10/19/2021</a:t>
             </a:fld>
             <a:endParaRPr lang="en-US"/>
           </a:p>
@@ -2094,7 +2821,7 @@
           <a:p>
             <a:fld id="{F127BA44-DA6A-4D35-B15C-91318AE39EDA}" type="datetimeFigureOut">
               <a:rPr lang="en-US" smtClean="0"/>
-              <a:t>10/18/2021</a:t>
+              <a:t>10/19/2021</a:t>
             </a:fld>
             <a:endParaRPr lang="en-US"/>
           </a:p>
@@ -2405,7 +3132,7 @@
           <a:p>
             <a:fld id="{F127BA44-DA6A-4D35-B15C-91318AE39EDA}" type="datetimeFigureOut">
               <a:rPr lang="en-US" smtClean="0"/>
-              <a:t>10/18/2021</a:t>
+              <a:t>10/19/2021</a:t>
             </a:fld>
             <a:endParaRPr lang="en-US"/>
           </a:p>
@@ -2693,7 +3420,7 @@
           <a:p>
             <a:fld id="{F127BA44-DA6A-4D35-B15C-91318AE39EDA}" type="datetimeFigureOut">
               <a:rPr lang="en-US" smtClean="0"/>
-              <a:t>10/18/2021</a:t>
+              <a:t>10/19/2021</a:t>
             </a:fld>
             <a:endParaRPr lang="en-US"/>
           </a:p>
@@ -2934,7 +3661,7 @@
           <a:p>
             <a:fld id="{F127BA44-DA6A-4D35-B15C-91318AE39EDA}" type="datetimeFigureOut">
               <a:rPr lang="en-US" smtClean="0"/>
-              <a:t>10/18/2021</a:t>
+              <a:t>10/19/2021</a:t>
             </a:fld>
             <a:endParaRPr lang="en-US"/>
           </a:p>
@@ -3468,6 +4195,845 @@
 </p:sld>
 </file>
 
+<file path=ppt/slides/slide10.xml><?xml version="1.0" encoding="utf-8"?>
+<p:sld xmlns:a="http://schemas.openxmlformats.org/drawingml/2006/main" xmlns:r="http://schemas.openxmlformats.org/officeDocument/2006/relationships" xmlns:p="http://schemas.openxmlformats.org/presentationml/2006/main">
+  <p:cSld>
+    <p:spTree>
+      <p:nvGrpSpPr>
+        <p:cNvPr id="1" name=""/>
+        <p:cNvGrpSpPr/>
+        <p:nvPr/>
+      </p:nvGrpSpPr>
+      <p:grpSpPr>
+        <a:xfrm>
+          <a:off x="0" y="0"/>
+          <a:ext cx="0" cy="0"/>
+          <a:chOff x="0" y="0"/>
+          <a:chExt cx="0" cy="0"/>
+        </a:xfrm>
+      </p:grpSpPr>
+      <p:sp>
+        <p:nvSpPr>
+          <p:cNvPr id="2" name="Title 1">
+            <a:extLst>
+              <a:ext uri="{FF2B5EF4-FFF2-40B4-BE49-F238E27FC236}">
+                <a16:creationId xmlns:a16="http://schemas.microsoft.com/office/drawing/2014/main" id="{E2A49108-552F-44DB-AD69-F71553B294DF}"/>
+              </a:ext>
+            </a:extLst>
+          </p:cNvPr>
+          <p:cNvSpPr>
+            <a:spLocks noGrp="1"/>
+          </p:cNvSpPr>
+          <p:nvPr>
+            <p:ph type="title"/>
+          </p:nvPr>
+        </p:nvSpPr>
+        <p:spPr/>
+        <p:txBody>
+          <a:bodyPr/>
+          <a:lstStyle/>
+          <a:p>
+            <a:r>
+              <a:rPr lang="en-US" dirty="0"/>
+              <a:t>Pipeline</a:t>
+            </a:r>
+          </a:p>
+        </p:txBody>
+      </p:sp>
+      <p:sp>
+        <p:nvSpPr>
+          <p:cNvPr id="3" name="Content Placeholder 2">
+            <a:extLst>
+              <a:ext uri="{FF2B5EF4-FFF2-40B4-BE49-F238E27FC236}">
+                <a16:creationId xmlns:a16="http://schemas.microsoft.com/office/drawing/2014/main" id="{4A7F540F-FCED-4EC7-AB4E-A1ED01FD36B8}"/>
+              </a:ext>
+            </a:extLst>
+          </p:cNvPr>
+          <p:cNvSpPr>
+            <a:spLocks noGrp="1"/>
+          </p:cNvSpPr>
+          <p:nvPr>
+            <p:ph idx="1"/>
+          </p:nvPr>
+        </p:nvSpPr>
+        <p:spPr/>
+        <p:txBody>
+          <a:bodyPr/>
+          <a:lstStyle/>
+          <a:p>
+            <a:r>
+              <a:rPr lang="en-US" dirty="0"/>
+              <a:t>Data -&gt; Complex -&gt; Persistence Diagram -&gt; Interpretation</a:t>
+            </a:r>
+          </a:p>
+        </p:txBody>
+      </p:sp>
+    </p:spTree>
+    <p:extLst>
+      <p:ext uri="{BB962C8B-B14F-4D97-AF65-F5344CB8AC3E}">
+        <p14:creationId xmlns:p14="http://schemas.microsoft.com/office/powerpoint/2010/main" val="3895794643"/>
+      </p:ext>
+    </p:extLst>
+  </p:cSld>
+  <p:clrMapOvr>
+    <a:masterClrMapping/>
+  </p:clrMapOvr>
+</p:sld>
+</file>
+
+<file path=ppt/slides/slide11.xml><?xml version="1.0" encoding="utf-8"?>
+<p:sld xmlns:a="http://schemas.openxmlformats.org/drawingml/2006/main" xmlns:r="http://schemas.openxmlformats.org/officeDocument/2006/relationships" xmlns:p="http://schemas.openxmlformats.org/presentationml/2006/main">
+  <p:cSld>
+    <p:spTree>
+      <p:nvGrpSpPr>
+        <p:cNvPr id="1" name=""/>
+        <p:cNvGrpSpPr/>
+        <p:nvPr/>
+      </p:nvGrpSpPr>
+      <p:grpSpPr>
+        <a:xfrm>
+          <a:off x="0" y="0"/>
+          <a:ext cx="0" cy="0"/>
+          <a:chOff x="0" y="0"/>
+          <a:chExt cx="0" cy="0"/>
+        </a:xfrm>
+      </p:grpSpPr>
+      <p:sp>
+        <p:nvSpPr>
+          <p:cNvPr id="2" name="Title 1">
+            <a:extLst>
+              <a:ext uri="{FF2B5EF4-FFF2-40B4-BE49-F238E27FC236}">
+                <a16:creationId xmlns:a16="http://schemas.microsoft.com/office/drawing/2014/main" id="{7A1FF188-A85C-405C-80B7-02D74451D047}"/>
+              </a:ext>
+            </a:extLst>
+          </p:cNvPr>
+          <p:cNvSpPr>
+            <a:spLocks noGrp="1"/>
+          </p:cNvSpPr>
+          <p:nvPr>
+            <p:ph type="title"/>
+          </p:nvPr>
+        </p:nvSpPr>
+        <p:spPr/>
+        <p:txBody>
+          <a:bodyPr/>
+          <a:lstStyle/>
+          <a:p>
+            <a:r>
+              <a:rPr lang="en-US" dirty="0"/>
+              <a:t>Main question:</a:t>
+            </a:r>
+          </a:p>
+        </p:txBody>
+      </p:sp>
+      <p:sp>
+        <p:nvSpPr>
+          <p:cNvPr id="3" name="Content Placeholder 2">
+            <a:extLst>
+              <a:ext uri="{FF2B5EF4-FFF2-40B4-BE49-F238E27FC236}">
+                <a16:creationId xmlns:a16="http://schemas.microsoft.com/office/drawing/2014/main" id="{104BC9CE-4E40-420E-933A-4A0AE968B7A4}"/>
+              </a:ext>
+            </a:extLst>
+          </p:cNvPr>
+          <p:cNvSpPr>
+            <a:spLocks noGrp="1"/>
+          </p:cNvSpPr>
+          <p:nvPr>
+            <p:ph idx="1"/>
+          </p:nvPr>
+        </p:nvSpPr>
+        <p:spPr/>
+        <p:txBody>
+          <a:bodyPr/>
+          <a:lstStyle/>
+          <a:p>
+            <a:pPr marL="0" indent="0">
+              <a:buNone/>
+            </a:pPr>
+            <a:r>
+              <a:rPr lang="en-US" dirty="0"/>
+              <a:t>Can we do it faster?</a:t>
+            </a:r>
+          </a:p>
+        </p:txBody>
+      </p:sp>
+    </p:spTree>
+    <p:extLst>
+      <p:ext uri="{BB962C8B-B14F-4D97-AF65-F5344CB8AC3E}">
+        <p14:creationId xmlns:p14="http://schemas.microsoft.com/office/powerpoint/2010/main" val="580734797"/>
+      </p:ext>
+    </p:extLst>
+  </p:cSld>
+  <p:clrMapOvr>
+    <a:masterClrMapping/>
+  </p:clrMapOvr>
+</p:sld>
+</file>
+
+<file path=ppt/slides/slide12.xml><?xml version="1.0" encoding="utf-8"?>
+<p:sld xmlns:a="http://schemas.openxmlformats.org/drawingml/2006/main" xmlns:r="http://schemas.openxmlformats.org/officeDocument/2006/relationships" xmlns:p="http://schemas.openxmlformats.org/presentationml/2006/main">
+  <p:cSld>
+    <p:spTree>
+      <p:nvGrpSpPr>
+        <p:cNvPr id="1" name=""/>
+        <p:cNvGrpSpPr/>
+        <p:nvPr/>
+      </p:nvGrpSpPr>
+      <p:grpSpPr>
+        <a:xfrm>
+          <a:off x="0" y="0"/>
+          <a:ext cx="0" cy="0"/>
+          <a:chOff x="0" y="0"/>
+          <a:chExt cx="0" cy="0"/>
+        </a:xfrm>
+      </p:grpSpPr>
+      <p:sp>
+        <p:nvSpPr>
+          <p:cNvPr id="2" name="Title 1">
+            <a:extLst>
+              <a:ext uri="{FF2B5EF4-FFF2-40B4-BE49-F238E27FC236}">
+                <a16:creationId xmlns:a16="http://schemas.microsoft.com/office/drawing/2014/main" id="{22FD8358-5810-442B-9A33-27D14DF76B44}"/>
+              </a:ext>
+            </a:extLst>
+          </p:cNvPr>
+          <p:cNvSpPr>
+            <a:spLocks noGrp="1"/>
+          </p:cNvSpPr>
+          <p:nvPr>
+            <p:ph type="ctrTitle"/>
+          </p:nvPr>
+        </p:nvSpPr>
+        <p:spPr/>
+        <p:txBody>
+          <a:bodyPr/>
+          <a:lstStyle/>
+          <a:p>
+            <a:r>
+              <a:rPr lang="en-US" dirty="0"/>
+              <a:t>Rips</a:t>
+            </a:r>
+          </a:p>
+        </p:txBody>
+      </p:sp>
+      <p:sp>
+        <p:nvSpPr>
+          <p:cNvPr id="3" name="Subtitle 2">
+            <a:extLst>
+              <a:ext uri="{FF2B5EF4-FFF2-40B4-BE49-F238E27FC236}">
+                <a16:creationId xmlns:a16="http://schemas.microsoft.com/office/drawing/2014/main" id="{E19A836D-5A9A-47AE-9B73-0D2A777051AF}"/>
+              </a:ext>
+            </a:extLst>
+          </p:cNvPr>
+          <p:cNvSpPr>
+            <a:spLocks noGrp="1"/>
+          </p:cNvSpPr>
+          <p:nvPr>
+            <p:ph type="subTitle" idx="1"/>
+          </p:nvPr>
+        </p:nvSpPr>
+        <p:spPr/>
+        <p:txBody>
+          <a:bodyPr/>
+          <a:lstStyle/>
+          <a:p>
+            <a:endParaRPr lang="en-US"/>
+          </a:p>
+        </p:txBody>
+      </p:sp>
+    </p:spTree>
+    <p:extLst>
+      <p:ext uri="{BB962C8B-B14F-4D97-AF65-F5344CB8AC3E}">
+        <p14:creationId xmlns:p14="http://schemas.microsoft.com/office/powerpoint/2010/main" val="3098761963"/>
+      </p:ext>
+    </p:extLst>
+  </p:cSld>
+  <p:clrMapOvr>
+    <a:masterClrMapping/>
+  </p:clrMapOvr>
+</p:sld>
+</file>
+
+<file path=ppt/slides/slide13.xml><?xml version="1.0" encoding="utf-8"?>
+<p:sld xmlns:a="http://schemas.openxmlformats.org/drawingml/2006/main" xmlns:r="http://schemas.openxmlformats.org/officeDocument/2006/relationships" xmlns:p="http://schemas.openxmlformats.org/presentationml/2006/main">
+  <p:cSld>
+    <p:spTree>
+      <p:nvGrpSpPr>
+        <p:cNvPr id="1" name=""/>
+        <p:cNvGrpSpPr/>
+        <p:nvPr/>
+      </p:nvGrpSpPr>
+      <p:grpSpPr>
+        <a:xfrm>
+          <a:off x="0" y="0"/>
+          <a:ext cx="0" cy="0"/>
+          <a:chOff x="0" y="0"/>
+          <a:chExt cx="0" cy="0"/>
+        </a:xfrm>
+      </p:grpSpPr>
+      <p:sp>
+        <p:nvSpPr>
+          <p:cNvPr id="2" name="Title 1">
+            <a:extLst>
+              <a:ext uri="{FF2B5EF4-FFF2-40B4-BE49-F238E27FC236}">
+                <a16:creationId xmlns:a16="http://schemas.microsoft.com/office/drawing/2014/main" id="{9639295C-C128-4929-9ED2-69C125134DE7}"/>
+              </a:ext>
+            </a:extLst>
+          </p:cNvPr>
+          <p:cNvSpPr>
+            <a:spLocks noGrp="1"/>
+          </p:cNvSpPr>
+          <p:nvPr>
+            <p:ph type="title"/>
+          </p:nvPr>
+        </p:nvSpPr>
+        <p:spPr/>
+        <p:txBody>
+          <a:bodyPr/>
+          <a:lstStyle/>
+          <a:p>
+            <a:r>
+              <a:rPr lang="en-US" dirty="0"/>
+              <a:t>Rips animation</a:t>
+            </a:r>
+          </a:p>
+        </p:txBody>
+      </p:sp>
+      <p:sp>
+        <p:nvSpPr>
+          <p:cNvPr id="3" name="Content Placeholder 2">
+            <a:extLst>
+              <a:ext uri="{FF2B5EF4-FFF2-40B4-BE49-F238E27FC236}">
+                <a16:creationId xmlns:a16="http://schemas.microsoft.com/office/drawing/2014/main" id="{B097B762-7992-42FB-9FFB-511D44E1A67E}"/>
+              </a:ext>
+            </a:extLst>
+          </p:cNvPr>
+          <p:cNvSpPr>
+            <a:spLocks noGrp="1"/>
+          </p:cNvSpPr>
+          <p:nvPr>
+            <p:ph idx="1"/>
+          </p:nvPr>
+        </p:nvSpPr>
+        <p:spPr/>
+        <p:txBody>
+          <a:bodyPr/>
+          <a:lstStyle/>
+          <a:p>
+            <a:endParaRPr lang="en-US"/>
+          </a:p>
+        </p:txBody>
+      </p:sp>
+    </p:spTree>
+    <p:extLst>
+      <p:ext uri="{BB962C8B-B14F-4D97-AF65-F5344CB8AC3E}">
+        <p14:creationId xmlns:p14="http://schemas.microsoft.com/office/powerpoint/2010/main" val="1813657424"/>
+      </p:ext>
+    </p:extLst>
+  </p:cSld>
+  <p:clrMapOvr>
+    <a:masterClrMapping/>
+  </p:clrMapOvr>
+</p:sld>
+</file>
+
+<file path=ppt/slides/slide14.xml><?xml version="1.0" encoding="utf-8"?>
+<p:sld xmlns:a="http://schemas.openxmlformats.org/drawingml/2006/main" xmlns:r="http://schemas.openxmlformats.org/officeDocument/2006/relationships" xmlns:p="http://schemas.openxmlformats.org/presentationml/2006/main">
+  <p:cSld>
+    <p:spTree>
+      <p:nvGrpSpPr>
+        <p:cNvPr id="1" name=""/>
+        <p:cNvGrpSpPr/>
+        <p:nvPr/>
+      </p:nvGrpSpPr>
+      <p:grpSpPr>
+        <a:xfrm>
+          <a:off x="0" y="0"/>
+          <a:ext cx="0" cy="0"/>
+          <a:chOff x="0" y="0"/>
+          <a:chExt cx="0" cy="0"/>
+        </a:xfrm>
+      </p:grpSpPr>
+      <p:sp>
+        <p:nvSpPr>
+          <p:cNvPr id="2" name="Title 1">
+            <a:extLst>
+              <a:ext uri="{FF2B5EF4-FFF2-40B4-BE49-F238E27FC236}">
+                <a16:creationId xmlns:a16="http://schemas.microsoft.com/office/drawing/2014/main" id="{0B43B281-7344-4E7B-AAEB-401F8CFB0DA0}"/>
+              </a:ext>
+            </a:extLst>
+          </p:cNvPr>
+          <p:cNvSpPr>
+            <a:spLocks noGrp="1"/>
+          </p:cNvSpPr>
+          <p:nvPr>
+            <p:ph type="title"/>
+          </p:nvPr>
+        </p:nvSpPr>
+        <p:spPr/>
+        <p:txBody>
+          <a:bodyPr/>
+          <a:lstStyle/>
+          <a:p>
+            <a:r>
+              <a:rPr lang="en-US" dirty="0"/>
+              <a:t>PD interpretation</a:t>
+            </a:r>
+          </a:p>
+        </p:txBody>
+      </p:sp>
+      <p:sp>
+        <p:nvSpPr>
+          <p:cNvPr id="3" name="Content Placeholder 2">
+            <a:extLst>
+              <a:ext uri="{FF2B5EF4-FFF2-40B4-BE49-F238E27FC236}">
+                <a16:creationId xmlns:a16="http://schemas.microsoft.com/office/drawing/2014/main" id="{DB4C3D1C-40A3-427D-8B12-7D7AED3D21E7}"/>
+              </a:ext>
+            </a:extLst>
+          </p:cNvPr>
+          <p:cNvSpPr>
+            <a:spLocks noGrp="1"/>
+          </p:cNvSpPr>
+          <p:nvPr>
+            <p:ph idx="1"/>
+          </p:nvPr>
+        </p:nvSpPr>
+        <p:spPr/>
+        <p:txBody>
+          <a:bodyPr/>
+          <a:lstStyle/>
+          <a:p>
+            <a:endParaRPr lang="en-US"/>
+          </a:p>
+        </p:txBody>
+      </p:sp>
+    </p:spTree>
+    <p:extLst>
+      <p:ext uri="{BB962C8B-B14F-4D97-AF65-F5344CB8AC3E}">
+        <p14:creationId xmlns:p14="http://schemas.microsoft.com/office/powerpoint/2010/main" val="4056124821"/>
+      </p:ext>
+    </p:extLst>
+  </p:cSld>
+  <p:clrMapOvr>
+    <a:masterClrMapping/>
+  </p:clrMapOvr>
+</p:sld>
+</file>
+
+<file path=ppt/slides/slide15.xml><?xml version="1.0" encoding="utf-8"?>
+<p:sld xmlns:a="http://schemas.openxmlformats.org/drawingml/2006/main" xmlns:r="http://schemas.openxmlformats.org/officeDocument/2006/relationships" xmlns:p="http://schemas.openxmlformats.org/presentationml/2006/main">
+  <p:cSld>
+    <p:spTree>
+      <p:nvGrpSpPr>
+        <p:cNvPr id="1" name=""/>
+        <p:cNvGrpSpPr/>
+        <p:nvPr/>
+      </p:nvGrpSpPr>
+      <p:grpSpPr>
+        <a:xfrm>
+          <a:off x="0" y="0"/>
+          <a:ext cx="0" cy="0"/>
+          <a:chOff x="0" y="0"/>
+          <a:chExt cx="0" cy="0"/>
+        </a:xfrm>
+      </p:grpSpPr>
+      <p:sp>
+        <p:nvSpPr>
+          <p:cNvPr id="2" name="Title 1">
+            <a:extLst>
+              <a:ext uri="{FF2B5EF4-FFF2-40B4-BE49-F238E27FC236}">
+                <a16:creationId xmlns:a16="http://schemas.microsoft.com/office/drawing/2014/main" id="{5C988865-0941-4A6C-8EAE-B9897604FB32}"/>
+              </a:ext>
+            </a:extLst>
+          </p:cNvPr>
+          <p:cNvSpPr>
+            <a:spLocks noGrp="1"/>
+          </p:cNvSpPr>
+          <p:nvPr>
+            <p:ph type="title"/>
+          </p:nvPr>
+        </p:nvSpPr>
+        <p:spPr/>
+        <p:txBody>
+          <a:bodyPr/>
+          <a:lstStyle/>
+          <a:p>
+            <a:r>
+              <a:rPr lang="en-US" dirty="0"/>
+              <a:t>Del-Rips</a:t>
+            </a:r>
+          </a:p>
+        </p:txBody>
+      </p:sp>
+      <p:sp>
+        <p:nvSpPr>
+          <p:cNvPr id="3" name="Content Placeholder 2">
+            <a:extLst>
+              <a:ext uri="{FF2B5EF4-FFF2-40B4-BE49-F238E27FC236}">
+                <a16:creationId xmlns:a16="http://schemas.microsoft.com/office/drawing/2014/main" id="{46BE49C2-98AB-4723-BE63-235895ED1B7B}"/>
+              </a:ext>
+            </a:extLst>
+          </p:cNvPr>
+          <p:cNvSpPr>
+            <a:spLocks noGrp="1"/>
+          </p:cNvSpPr>
+          <p:nvPr>
+            <p:ph idx="1"/>
+          </p:nvPr>
+        </p:nvSpPr>
+        <p:spPr/>
+        <p:txBody>
+          <a:bodyPr/>
+          <a:lstStyle/>
+          <a:p>
+            <a:endParaRPr lang="en-US"/>
+          </a:p>
+        </p:txBody>
+      </p:sp>
+    </p:spTree>
+    <p:extLst>
+      <p:ext uri="{BB962C8B-B14F-4D97-AF65-F5344CB8AC3E}">
+        <p14:creationId xmlns:p14="http://schemas.microsoft.com/office/powerpoint/2010/main" val="1415692872"/>
+      </p:ext>
+    </p:extLst>
+  </p:cSld>
+  <p:clrMapOvr>
+    <a:masterClrMapping/>
+  </p:clrMapOvr>
+</p:sld>
+</file>
+
+<file path=ppt/slides/slide16.xml><?xml version="1.0" encoding="utf-8"?>
+<p:sld xmlns:a="http://schemas.openxmlformats.org/drawingml/2006/main" xmlns:r="http://schemas.openxmlformats.org/officeDocument/2006/relationships" xmlns:p="http://schemas.openxmlformats.org/presentationml/2006/main">
+  <p:cSld>
+    <p:spTree>
+      <p:nvGrpSpPr>
+        <p:cNvPr id="1" name=""/>
+        <p:cNvGrpSpPr/>
+        <p:nvPr/>
+      </p:nvGrpSpPr>
+      <p:grpSpPr>
+        <a:xfrm>
+          <a:off x="0" y="0"/>
+          <a:ext cx="0" cy="0"/>
+          <a:chOff x="0" y="0"/>
+          <a:chExt cx="0" cy="0"/>
+        </a:xfrm>
+      </p:grpSpPr>
+      <p:sp>
+        <p:nvSpPr>
+          <p:cNvPr id="2" name="Title 1">
+            <a:extLst>
+              <a:ext uri="{FF2B5EF4-FFF2-40B4-BE49-F238E27FC236}">
+                <a16:creationId xmlns:a16="http://schemas.microsoft.com/office/drawing/2014/main" id="{A294656F-ABB1-43D2-BFB2-5FF0E2EC23F7}"/>
+              </a:ext>
+            </a:extLst>
+          </p:cNvPr>
+          <p:cNvSpPr>
+            <a:spLocks noGrp="1"/>
+          </p:cNvSpPr>
+          <p:nvPr>
+            <p:ph type="title"/>
+          </p:nvPr>
+        </p:nvSpPr>
+        <p:spPr/>
+        <p:txBody>
+          <a:bodyPr/>
+          <a:lstStyle/>
+          <a:p>
+            <a:r>
+              <a:rPr lang="en-US" dirty="0"/>
+              <a:t>Del-Rips animation</a:t>
+            </a:r>
+          </a:p>
+        </p:txBody>
+      </p:sp>
+      <p:sp>
+        <p:nvSpPr>
+          <p:cNvPr id="3" name="Content Placeholder 2">
+            <a:extLst>
+              <a:ext uri="{FF2B5EF4-FFF2-40B4-BE49-F238E27FC236}">
+                <a16:creationId xmlns:a16="http://schemas.microsoft.com/office/drawing/2014/main" id="{39B20801-5078-41E5-B2B2-53B23D43D421}"/>
+              </a:ext>
+            </a:extLst>
+          </p:cNvPr>
+          <p:cNvSpPr>
+            <a:spLocks noGrp="1"/>
+          </p:cNvSpPr>
+          <p:nvPr>
+            <p:ph idx="1"/>
+          </p:nvPr>
+        </p:nvSpPr>
+        <p:spPr/>
+        <p:txBody>
+          <a:bodyPr/>
+          <a:lstStyle/>
+          <a:p>
+            <a:endParaRPr lang="en-US"/>
+          </a:p>
+        </p:txBody>
+      </p:sp>
+    </p:spTree>
+    <p:extLst>
+      <p:ext uri="{BB962C8B-B14F-4D97-AF65-F5344CB8AC3E}">
+        <p14:creationId xmlns:p14="http://schemas.microsoft.com/office/powerpoint/2010/main" val="466024612"/>
+      </p:ext>
+    </p:extLst>
+  </p:cSld>
+  <p:clrMapOvr>
+    <a:masterClrMapping/>
+  </p:clrMapOvr>
+</p:sld>
+</file>
+
+<file path=ppt/slides/slide17.xml><?xml version="1.0" encoding="utf-8"?>
+<p:sld xmlns:a="http://schemas.openxmlformats.org/drawingml/2006/main" xmlns:r="http://schemas.openxmlformats.org/officeDocument/2006/relationships" xmlns:p="http://schemas.openxmlformats.org/presentationml/2006/main">
+  <p:cSld>
+    <p:spTree>
+      <p:nvGrpSpPr>
+        <p:cNvPr id="1" name=""/>
+        <p:cNvGrpSpPr/>
+        <p:nvPr/>
+      </p:nvGrpSpPr>
+      <p:grpSpPr>
+        <a:xfrm>
+          <a:off x="0" y="0"/>
+          <a:ext cx="0" cy="0"/>
+          <a:chOff x="0" y="0"/>
+          <a:chExt cx="0" cy="0"/>
+        </a:xfrm>
+      </p:grpSpPr>
+      <p:sp>
+        <p:nvSpPr>
+          <p:cNvPr id="2" name="Title 1">
+            <a:extLst>
+              <a:ext uri="{FF2B5EF4-FFF2-40B4-BE49-F238E27FC236}">
+                <a16:creationId xmlns:a16="http://schemas.microsoft.com/office/drawing/2014/main" id="{37F47405-FD64-4A34-A47E-4C6064DD66FC}"/>
+              </a:ext>
+            </a:extLst>
+          </p:cNvPr>
+          <p:cNvSpPr>
+            <a:spLocks noGrp="1"/>
+          </p:cNvSpPr>
+          <p:nvPr>
+            <p:ph type="title"/>
+          </p:nvPr>
+        </p:nvSpPr>
+        <p:spPr/>
+        <p:txBody>
+          <a:bodyPr/>
+          <a:lstStyle/>
+          <a:p>
+            <a:r>
+              <a:rPr lang="en-US" dirty="0"/>
+              <a:t>Persistence diagram comparison</a:t>
+            </a:r>
+          </a:p>
+        </p:txBody>
+      </p:sp>
+      <p:sp>
+        <p:nvSpPr>
+          <p:cNvPr id="3" name="Content Placeholder 2">
+            <a:extLst>
+              <a:ext uri="{FF2B5EF4-FFF2-40B4-BE49-F238E27FC236}">
+                <a16:creationId xmlns:a16="http://schemas.microsoft.com/office/drawing/2014/main" id="{FC331CFD-469A-4E7A-BC25-6E96A69C8F56}"/>
+              </a:ext>
+            </a:extLst>
+          </p:cNvPr>
+          <p:cNvSpPr>
+            <a:spLocks noGrp="1"/>
+          </p:cNvSpPr>
+          <p:nvPr>
+            <p:ph idx="1"/>
+          </p:nvPr>
+        </p:nvSpPr>
+        <p:spPr/>
+        <p:txBody>
+          <a:bodyPr/>
+          <a:lstStyle/>
+          <a:p>
+            <a:endParaRPr lang="en-US"/>
+          </a:p>
+        </p:txBody>
+      </p:sp>
+    </p:spTree>
+    <p:extLst>
+      <p:ext uri="{BB962C8B-B14F-4D97-AF65-F5344CB8AC3E}">
+        <p14:creationId xmlns:p14="http://schemas.microsoft.com/office/powerpoint/2010/main" val="2372899896"/>
+      </p:ext>
+    </p:extLst>
+  </p:cSld>
+  <p:clrMapOvr>
+    <a:masterClrMapping/>
+  </p:clrMapOvr>
+</p:sld>
+</file>
+
+<file path=ppt/slides/slide18.xml><?xml version="1.0" encoding="utf-8"?>
+<p:sld xmlns:a="http://schemas.openxmlformats.org/drawingml/2006/main" xmlns:r="http://schemas.openxmlformats.org/officeDocument/2006/relationships" xmlns:p="http://schemas.openxmlformats.org/presentationml/2006/main">
+  <p:cSld>
+    <p:spTree>
+      <p:nvGrpSpPr>
+        <p:cNvPr id="1" name=""/>
+        <p:cNvGrpSpPr/>
+        <p:nvPr/>
+      </p:nvGrpSpPr>
+      <p:grpSpPr>
+        <a:xfrm>
+          <a:off x="0" y="0"/>
+          <a:ext cx="0" cy="0"/>
+          <a:chOff x="0" y="0"/>
+          <a:chExt cx="0" cy="0"/>
+        </a:xfrm>
+      </p:grpSpPr>
+      <p:sp>
+        <p:nvSpPr>
+          <p:cNvPr id="2" name="Title 1">
+            <a:extLst>
+              <a:ext uri="{FF2B5EF4-FFF2-40B4-BE49-F238E27FC236}">
+                <a16:creationId xmlns:a16="http://schemas.microsoft.com/office/drawing/2014/main" id="{148909F6-58A0-4359-B157-945B229E4062}"/>
+              </a:ext>
+            </a:extLst>
+          </p:cNvPr>
+          <p:cNvSpPr>
+            <a:spLocks noGrp="1"/>
+          </p:cNvSpPr>
+          <p:nvPr>
+            <p:ph type="title"/>
+          </p:nvPr>
+        </p:nvSpPr>
+        <p:spPr/>
+        <p:txBody>
+          <a:bodyPr/>
+          <a:lstStyle/>
+          <a:p>
+            <a:r>
+              <a:rPr lang="en-US" dirty="0"/>
+              <a:t>Run-time comparison</a:t>
+            </a:r>
+          </a:p>
+        </p:txBody>
+      </p:sp>
+      <p:sp>
+        <p:nvSpPr>
+          <p:cNvPr id="3" name="Content Placeholder 2">
+            <a:extLst>
+              <a:ext uri="{FF2B5EF4-FFF2-40B4-BE49-F238E27FC236}">
+                <a16:creationId xmlns:a16="http://schemas.microsoft.com/office/drawing/2014/main" id="{141C02A9-3F2A-4E22-975D-8B4229C14199}"/>
+              </a:ext>
+            </a:extLst>
+          </p:cNvPr>
+          <p:cNvSpPr>
+            <a:spLocks noGrp="1"/>
+          </p:cNvSpPr>
+          <p:nvPr>
+            <p:ph idx="1"/>
+          </p:nvPr>
+        </p:nvSpPr>
+        <p:spPr/>
+        <p:txBody>
+          <a:bodyPr/>
+          <a:lstStyle/>
+          <a:p>
+            <a:endParaRPr lang="en-US"/>
+          </a:p>
+        </p:txBody>
+      </p:sp>
+    </p:spTree>
+    <p:extLst>
+      <p:ext uri="{BB962C8B-B14F-4D97-AF65-F5344CB8AC3E}">
+        <p14:creationId xmlns:p14="http://schemas.microsoft.com/office/powerpoint/2010/main" val="1212117778"/>
+      </p:ext>
+    </p:extLst>
+  </p:cSld>
+  <p:clrMapOvr>
+    <a:masterClrMapping/>
+  </p:clrMapOvr>
+</p:sld>
+</file>
+
+<file path=ppt/slides/slide19.xml><?xml version="1.0" encoding="utf-8"?>
+<p:sld xmlns:a="http://schemas.openxmlformats.org/drawingml/2006/main" xmlns:r="http://schemas.openxmlformats.org/officeDocument/2006/relationships" xmlns:p="http://schemas.openxmlformats.org/presentationml/2006/main">
+  <p:cSld>
+    <p:spTree>
+      <p:nvGrpSpPr>
+        <p:cNvPr id="1" name=""/>
+        <p:cNvGrpSpPr/>
+        <p:nvPr/>
+      </p:nvGrpSpPr>
+      <p:grpSpPr>
+        <a:xfrm>
+          <a:off x="0" y="0"/>
+          <a:ext cx="0" cy="0"/>
+          <a:chOff x="0" y="0"/>
+          <a:chExt cx="0" cy="0"/>
+        </a:xfrm>
+      </p:grpSpPr>
+      <p:sp>
+        <p:nvSpPr>
+          <p:cNvPr id="2" name="Title 1">
+            <a:extLst>
+              <a:ext uri="{FF2B5EF4-FFF2-40B4-BE49-F238E27FC236}">
+                <a16:creationId xmlns:a16="http://schemas.microsoft.com/office/drawing/2014/main" id="{08F91A23-E5D4-4102-B864-41F545C3E32A}"/>
+              </a:ext>
+            </a:extLst>
+          </p:cNvPr>
+          <p:cNvSpPr>
+            <a:spLocks noGrp="1"/>
+          </p:cNvSpPr>
+          <p:nvPr>
+            <p:ph type="title"/>
+          </p:nvPr>
+        </p:nvSpPr>
+        <p:spPr/>
+        <p:txBody>
+          <a:bodyPr/>
+          <a:lstStyle/>
+          <a:p>
+            <a:r>
+              <a:rPr lang="en-US" dirty="0"/>
+              <a:t>Synthetic Data application</a:t>
+            </a:r>
+          </a:p>
+        </p:txBody>
+      </p:sp>
+      <p:sp>
+        <p:nvSpPr>
+          <p:cNvPr id="3" name="Content Placeholder 2">
+            <a:extLst>
+              <a:ext uri="{FF2B5EF4-FFF2-40B4-BE49-F238E27FC236}">
+                <a16:creationId xmlns:a16="http://schemas.microsoft.com/office/drawing/2014/main" id="{DBDDE038-6893-469A-A779-2DCBCA06FCF7}"/>
+              </a:ext>
+            </a:extLst>
+          </p:cNvPr>
+          <p:cNvSpPr>
+            <a:spLocks noGrp="1"/>
+          </p:cNvSpPr>
+          <p:nvPr>
+            <p:ph idx="1"/>
+          </p:nvPr>
+        </p:nvSpPr>
+        <p:spPr/>
+        <p:txBody>
+          <a:bodyPr/>
+          <a:lstStyle/>
+          <a:p>
+            <a:endParaRPr lang="en-US" dirty="0"/>
+          </a:p>
+        </p:txBody>
+      </p:sp>
+    </p:spTree>
+    <p:extLst>
+      <p:ext uri="{BB962C8B-B14F-4D97-AF65-F5344CB8AC3E}">
+        <p14:creationId xmlns:p14="http://schemas.microsoft.com/office/powerpoint/2010/main" val="3123712504"/>
+      </p:ext>
+    </p:extLst>
+  </p:cSld>
+  <p:clrMapOvr>
+    <a:masterClrMapping/>
+  </p:clrMapOvr>
+</p:sld>
+</file>
+
 <file path=ppt/slides/slide2.xml><?xml version="1.0" encoding="utf-8"?>
 <p:sld xmlns:a="http://schemas.openxmlformats.org/drawingml/2006/main" xmlns:r="http://schemas.openxmlformats.org/officeDocument/2006/relationships" xmlns:p="http://schemas.openxmlformats.org/presentationml/2006/main">
   <p:cSld>
@@ -3490,7 +5056,7 @@
           <p:cNvPr id="2" name="Title 1">
             <a:extLst>
               <a:ext uri="{FF2B5EF4-FFF2-40B4-BE49-F238E27FC236}">
-                <a16:creationId xmlns:a16="http://schemas.microsoft.com/office/drawing/2014/main" id="{37464E10-4814-4636-8D42-F66C4E18B609}"/>
+                <a16:creationId xmlns:a16="http://schemas.microsoft.com/office/drawing/2014/main" id="{662CF63D-66F0-4AE3-AEB8-F69896F34A3E}"/>
               </a:ext>
             </a:extLst>
           </p:cNvPr>
@@ -3508,43 +5074,888 @@
           <a:p>
             <a:r>
               <a:rPr lang="en-US" dirty="0"/>
-              <a:t>TDA (Topological Data Analysis)</a:t>
-            </a:r>
-          </a:p>
-        </p:txBody>
-      </p:sp>
-      <p:sp>
-        <p:nvSpPr>
-          <p:cNvPr id="3" name="Content Placeholder 2">
-            <a:extLst>
-              <a:ext uri="{FF2B5EF4-FFF2-40B4-BE49-F238E27FC236}">
-                <a16:creationId xmlns:a16="http://schemas.microsoft.com/office/drawing/2014/main" id="{9C8628E1-FC9B-46E5-8FAC-C3633B5AE826}"/>
-              </a:ext>
-            </a:extLst>
-          </p:cNvPr>
-          <p:cNvSpPr>
-            <a:spLocks noGrp="1"/>
-          </p:cNvSpPr>
+              <a:t>Anscombe’s Quartet</a:t>
+            </a:r>
+          </a:p>
+        </p:txBody>
+      </p:sp>
+      <p:pic>
+        <p:nvPicPr>
+          <p:cNvPr id="5" name="Content Placeholder 4" descr="Chart, scatter chart&#10;&#10;Description automatically generated">
+            <a:extLst>
+              <a:ext uri="{FF2B5EF4-FFF2-40B4-BE49-F238E27FC236}">
+                <a16:creationId xmlns:a16="http://schemas.microsoft.com/office/drawing/2014/main" id="{5EDB048F-C582-4F7B-B8A6-1D059FE0D820}"/>
+              </a:ext>
+            </a:extLst>
+          </p:cNvPr>
+          <p:cNvPicPr>
+            <a:picLocks noGrp="1" noChangeAspect="1"/>
+          </p:cNvPicPr>
           <p:nvPr>
             <p:ph idx="1"/>
           </p:nvPr>
-        </p:nvSpPr>
-        <p:spPr/>
-        <p:txBody>
-          <a:bodyPr/>
-          <a:lstStyle/>
-          <a:p>
-            <a:r>
-              <a:rPr lang="en-US" dirty="0"/>
-              <a:t>Pictures of data sets that have similar statistical information, but different topological/geometric features</a:t>
-            </a:r>
-          </a:p>
-        </p:txBody>
-      </p:sp>
+        </p:nvPicPr>
+        <p:blipFill>
+          <a:blip r:embed="rId3">
+            <a:extLst>
+              <a:ext uri="{28A0092B-C50C-407E-A947-70E740481C1C}">
+                <a14:useLocalDpi xmlns:a14="http://schemas.microsoft.com/office/drawing/2010/main" val="0"/>
+              </a:ext>
+            </a:extLst>
+          </a:blip>
+          <a:stretch>
+            <a:fillRect/>
+          </a:stretch>
+        </p:blipFill>
+        <p:spPr>
+          <a:xfrm>
+            <a:off x="2322322" y="1690688"/>
+            <a:ext cx="6593078" cy="4795434"/>
+          </a:xfrm>
+        </p:spPr>
+      </p:pic>
     </p:spTree>
     <p:extLst>
       <p:ext uri="{BB962C8B-B14F-4D97-AF65-F5344CB8AC3E}">
-        <p14:creationId xmlns:p14="http://schemas.microsoft.com/office/powerpoint/2010/main" val="3834989462"/>
+        <p14:creationId xmlns:p14="http://schemas.microsoft.com/office/powerpoint/2010/main" val="904421659"/>
+      </p:ext>
+    </p:extLst>
+  </p:cSld>
+  <p:clrMapOvr>
+    <a:masterClrMapping/>
+  </p:clrMapOvr>
+</p:sld>
+</file>
+
+<file path=ppt/slides/slide20.xml><?xml version="1.0" encoding="utf-8"?>
+<p:sld xmlns:a="http://schemas.openxmlformats.org/drawingml/2006/main" xmlns:r="http://schemas.openxmlformats.org/officeDocument/2006/relationships" xmlns:p="http://schemas.openxmlformats.org/presentationml/2006/main">
+  <p:cSld>
+    <p:spTree>
+      <p:nvGrpSpPr>
+        <p:cNvPr id="1" name=""/>
+        <p:cNvGrpSpPr/>
+        <p:nvPr/>
+      </p:nvGrpSpPr>
+      <p:grpSpPr>
+        <a:xfrm>
+          <a:off x="0" y="0"/>
+          <a:ext cx="0" cy="0"/>
+          <a:chOff x="0" y="0"/>
+          <a:chExt cx="0" cy="0"/>
+        </a:xfrm>
+      </p:grpSpPr>
+      <p:sp>
+        <p:nvSpPr>
+          <p:cNvPr id="2" name="Title 1">
+            <a:extLst>
+              <a:ext uri="{FF2B5EF4-FFF2-40B4-BE49-F238E27FC236}">
+                <a16:creationId xmlns:a16="http://schemas.microsoft.com/office/drawing/2014/main" id="{7655DF64-9491-44B5-B057-88E84285B9D0}"/>
+              </a:ext>
+            </a:extLst>
+          </p:cNvPr>
+          <p:cNvSpPr>
+            <a:spLocks noGrp="1"/>
+          </p:cNvSpPr>
+          <p:nvPr>
+            <p:ph type="title"/>
+          </p:nvPr>
+        </p:nvSpPr>
+        <p:spPr/>
+        <p:txBody>
+          <a:bodyPr/>
+          <a:lstStyle/>
+          <a:p>
+            <a:r>
+              <a:rPr lang="en-US" dirty="0"/>
+              <a:t>Definition of Rips</a:t>
+            </a:r>
+          </a:p>
+        </p:txBody>
+      </p:sp>
+      <p:sp>
+        <p:nvSpPr>
+          <p:cNvPr id="3" name="Content Placeholder 2">
+            <a:extLst>
+              <a:ext uri="{FF2B5EF4-FFF2-40B4-BE49-F238E27FC236}">
+                <a16:creationId xmlns:a16="http://schemas.microsoft.com/office/drawing/2014/main" id="{58624350-AEB1-4505-8A24-2BF20E0F9989}"/>
+              </a:ext>
+            </a:extLst>
+          </p:cNvPr>
+          <p:cNvSpPr>
+            <a:spLocks noGrp="1"/>
+          </p:cNvSpPr>
+          <p:nvPr>
+            <p:ph idx="1"/>
+          </p:nvPr>
+        </p:nvSpPr>
+        <p:spPr/>
+        <p:txBody>
+          <a:bodyPr/>
+          <a:lstStyle/>
+          <a:p>
+            <a:endParaRPr lang="en-US"/>
+          </a:p>
+        </p:txBody>
+      </p:sp>
+    </p:spTree>
+    <p:extLst>
+      <p:ext uri="{BB962C8B-B14F-4D97-AF65-F5344CB8AC3E}">
+        <p14:creationId xmlns:p14="http://schemas.microsoft.com/office/powerpoint/2010/main" val="2945926961"/>
+      </p:ext>
+    </p:extLst>
+  </p:cSld>
+  <p:clrMapOvr>
+    <a:masterClrMapping/>
+  </p:clrMapOvr>
+</p:sld>
+</file>
+
+<file path=ppt/slides/slide21.xml><?xml version="1.0" encoding="utf-8"?>
+<p:sld xmlns:a="http://schemas.openxmlformats.org/drawingml/2006/main" xmlns:r="http://schemas.openxmlformats.org/officeDocument/2006/relationships" xmlns:p="http://schemas.openxmlformats.org/presentationml/2006/main">
+  <p:cSld>
+    <p:spTree>
+      <p:nvGrpSpPr>
+        <p:cNvPr id="1" name=""/>
+        <p:cNvGrpSpPr/>
+        <p:nvPr/>
+      </p:nvGrpSpPr>
+      <p:grpSpPr>
+        <a:xfrm>
+          <a:off x="0" y="0"/>
+          <a:ext cx="0" cy="0"/>
+          <a:chOff x="0" y="0"/>
+          <a:chExt cx="0" cy="0"/>
+        </a:xfrm>
+      </p:grpSpPr>
+      <p:sp>
+        <p:nvSpPr>
+          <p:cNvPr id="2" name="Title 1">
+            <a:extLst>
+              <a:ext uri="{FF2B5EF4-FFF2-40B4-BE49-F238E27FC236}">
+                <a16:creationId xmlns:a16="http://schemas.microsoft.com/office/drawing/2014/main" id="{7FAE7A94-E254-49A5-ACED-D26866280C6A}"/>
+              </a:ext>
+            </a:extLst>
+          </p:cNvPr>
+          <p:cNvSpPr>
+            <a:spLocks noGrp="1"/>
+          </p:cNvSpPr>
+          <p:nvPr>
+            <p:ph type="title"/>
+          </p:nvPr>
+        </p:nvSpPr>
+        <p:spPr/>
+        <p:txBody>
+          <a:bodyPr/>
+          <a:lstStyle/>
+          <a:p>
+            <a:r>
+              <a:rPr lang="en-US" dirty="0"/>
+              <a:t>Definition of Delaunay Triangulation</a:t>
+            </a:r>
+          </a:p>
+        </p:txBody>
+      </p:sp>
+      <p:sp>
+        <p:nvSpPr>
+          <p:cNvPr id="3" name="Content Placeholder 2">
+            <a:extLst>
+              <a:ext uri="{FF2B5EF4-FFF2-40B4-BE49-F238E27FC236}">
+                <a16:creationId xmlns:a16="http://schemas.microsoft.com/office/drawing/2014/main" id="{ECCC3441-4346-4BD6-A6CA-42365F15912F}"/>
+              </a:ext>
+            </a:extLst>
+          </p:cNvPr>
+          <p:cNvSpPr>
+            <a:spLocks noGrp="1"/>
+          </p:cNvSpPr>
+          <p:nvPr>
+            <p:ph idx="1"/>
+          </p:nvPr>
+        </p:nvSpPr>
+        <p:spPr/>
+        <p:txBody>
+          <a:bodyPr/>
+          <a:lstStyle/>
+          <a:p>
+            <a:endParaRPr lang="en-US"/>
+          </a:p>
+        </p:txBody>
+      </p:sp>
+    </p:spTree>
+    <p:extLst>
+      <p:ext uri="{BB962C8B-B14F-4D97-AF65-F5344CB8AC3E}">
+        <p14:creationId xmlns:p14="http://schemas.microsoft.com/office/powerpoint/2010/main" val="362372622"/>
+      </p:ext>
+    </p:extLst>
+  </p:cSld>
+  <p:clrMapOvr>
+    <a:masterClrMapping/>
+  </p:clrMapOvr>
+</p:sld>
+</file>
+
+<file path=ppt/slides/slide22.xml><?xml version="1.0" encoding="utf-8"?>
+<p:sld xmlns:a="http://schemas.openxmlformats.org/drawingml/2006/main" xmlns:r="http://schemas.openxmlformats.org/officeDocument/2006/relationships" xmlns:p="http://schemas.openxmlformats.org/presentationml/2006/main">
+  <p:cSld>
+    <p:spTree>
+      <p:nvGrpSpPr>
+        <p:cNvPr id="1" name=""/>
+        <p:cNvGrpSpPr/>
+        <p:nvPr/>
+      </p:nvGrpSpPr>
+      <p:grpSpPr>
+        <a:xfrm>
+          <a:off x="0" y="0"/>
+          <a:ext cx="0" cy="0"/>
+          <a:chOff x="0" y="0"/>
+          <a:chExt cx="0" cy="0"/>
+        </a:xfrm>
+      </p:grpSpPr>
+      <p:sp>
+        <p:nvSpPr>
+          <p:cNvPr id="2" name="Title 1">
+            <a:extLst>
+              <a:ext uri="{FF2B5EF4-FFF2-40B4-BE49-F238E27FC236}">
+                <a16:creationId xmlns:a16="http://schemas.microsoft.com/office/drawing/2014/main" id="{A4090316-8AC3-46DA-A7DB-19A85CCF228C}"/>
+              </a:ext>
+            </a:extLst>
+          </p:cNvPr>
+          <p:cNvSpPr>
+            <a:spLocks noGrp="1"/>
+          </p:cNvSpPr>
+          <p:nvPr>
+            <p:ph type="title"/>
+          </p:nvPr>
+        </p:nvSpPr>
+        <p:spPr/>
+        <p:txBody>
+          <a:bodyPr/>
+          <a:lstStyle/>
+          <a:p>
+            <a:r>
+              <a:rPr lang="en-US" dirty="0"/>
+              <a:t>Definition of Delaunay-Rips complex</a:t>
+            </a:r>
+          </a:p>
+        </p:txBody>
+      </p:sp>
+      <p:sp>
+        <p:nvSpPr>
+          <p:cNvPr id="3" name="Content Placeholder 2">
+            <a:extLst>
+              <a:ext uri="{FF2B5EF4-FFF2-40B4-BE49-F238E27FC236}">
+                <a16:creationId xmlns:a16="http://schemas.microsoft.com/office/drawing/2014/main" id="{ADE6583E-DEDC-4CB1-8C45-26252F3555DC}"/>
+              </a:ext>
+            </a:extLst>
+          </p:cNvPr>
+          <p:cNvSpPr>
+            <a:spLocks noGrp="1"/>
+          </p:cNvSpPr>
+          <p:nvPr>
+            <p:ph idx="1"/>
+          </p:nvPr>
+        </p:nvSpPr>
+        <p:spPr/>
+        <p:txBody>
+          <a:bodyPr/>
+          <a:lstStyle/>
+          <a:p>
+            <a:endParaRPr lang="en-US"/>
+          </a:p>
+        </p:txBody>
+      </p:sp>
+    </p:spTree>
+    <p:extLst>
+      <p:ext uri="{BB962C8B-B14F-4D97-AF65-F5344CB8AC3E}">
+        <p14:creationId xmlns:p14="http://schemas.microsoft.com/office/powerpoint/2010/main" val="958182660"/>
+      </p:ext>
+    </p:extLst>
+  </p:cSld>
+  <p:clrMapOvr>
+    <a:masterClrMapping/>
+  </p:clrMapOvr>
+</p:sld>
+</file>
+
+<file path=ppt/slides/slide23.xml><?xml version="1.0" encoding="utf-8"?>
+<p:sld xmlns:a="http://schemas.openxmlformats.org/drawingml/2006/main" xmlns:r="http://schemas.openxmlformats.org/officeDocument/2006/relationships" xmlns:p="http://schemas.openxmlformats.org/presentationml/2006/main">
+  <p:cSld>
+    <p:spTree>
+      <p:nvGrpSpPr>
+        <p:cNvPr id="1" name=""/>
+        <p:cNvGrpSpPr/>
+        <p:nvPr/>
+      </p:nvGrpSpPr>
+      <p:grpSpPr>
+        <a:xfrm>
+          <a:off x="0" y="0"/>
+          <a:ext cx="0" cy="0"/>
+          <a:chOff x="0" y="0"/>
+          <a:chExt cx="0" cy="0"/>
+        </a:xfrm>
+      </p:grpSpPr>
+      <p:sp>
+        <p:nvSpPr>
+          <p:cNvPr id="2" name="Title 1">
+            <a:extLst>
+              <a:ext uri="{FF2B5EF4-FFF2-40B4-BE49-F238E27FC236}">
+                <a16:creationId xmlns:a16="http://schemas.microsoft.com/office/drawing/2014/main" id="{32490C54-DE49-4605-AD29-375539A426AF}"/>
+              </a:ext>
+            </a:extLst>
+          </p:cNvPr>
+          <p:cNvSpPr>
+            <a:spLocks noGrp="1"/>
+          </p:cNvSpPr>
+          <p:nvPr>
+            <p:ph type="title"/>
+          </p:nvPr>
+        </p:nvSpPr>
+        <p:spPr/>
+        <p:txBody>
+          <a:bodyPr/>
+          <a:lstStyle/>
+          <a:p>
+            <a:r>
+              <a:rPr lang="en-US" dirty="0"/>
+              <a:t>Definition of filtration</a:t>
+            </a:r>
+          </a:p>
+        </p:txBody>
+      </p:sp>
+      <p:sp>
+        <p:nvSpPr>
+          <p:cNvPr id="3" name="Content Placeholder 2">
+            <a:extLst>
+              <a:ext uri="{FF2B5EF4-FFF2-40B4-BE49-F238E27FC236}">
+                <a16:creationId xmlns:a16="http://schemas.microsoft.com/office/drawing/2014/main" id="{DB694986-464E-4202-8E2E-70062A876C11}"/>
+              </a:ext>
+            </a:extLst>
+          </p:cNvPr>
+          <p:cNvSpPr>
+            <a:spLocks noGrp="1"/>
+          </p:cNvSpPr>
+          <p:nvPr>
+            <p:ph idx="1"/>
+          </p:nvPr>
+        </p:nvSpPr>
+        <p:spPr/>
+        <p:txBody>
+          <a:bodyPr/>
+          <a:lstStyle/>
+          <a:p>
+            <a:endParaRPr lang="en-US"/>
+          </a:p>
+        </p:txBody>
+      </p:sp>
+    </p:spTree>
+    <p:extLst>
+      <p:ext uri="{BB962C8B-B14F-4D97-AF65-F5344CB8AC3E}">
+        <p14:creationId xmlns:p14="http://schemas.microsoft.com/office/powerpoint/2010/main" val="214124690"/>
+      </p:ext>
+    </p:extLst>
+  </p:cSld>
+  <p:clrMapOvr>
+    <a:masterClrMapping/>
+  </p:clrMapOvr>
+</p:sld>
+</file>
+
+<file path=ppt/slides/slide24.xml><?xml version="1.0" encoding="utf-8"?>
+<p:sld xmlns:a="http://schemas.openxmlformats.org/drawingml/2006/main" xmlns:r="http://schemas.openxmlformats.org/officeDocument/2006/relationships" xmlns:p="http://schemas.openxmlformats.org/presentationml/2006/main">
+  <p:cSld>
+    <p:spTree>
+      <p:nvGrpSpPr>
+        <p:cNvPr id="1" name=""/>
+        <p:cNvGrpSpPr/>
+        <p:nvPr/>
+      </p:nvGrpSpPr>
+      <p:grpSpPr>
+        <a:xfrm>
+          <a:off x="0" y="0"/>
+          <a:ext cx="0" cy="0"/>
+          <a:chOff x="0" y="0"/>
+          <a:chExt cx="0" cy="0"/>
+        </a:xfrm>
+      </p:grpSpPr>
+      <p:sp>
+        <p:nvSpPr>
+          <p:cNvPr id="2" name="Title 1">
+            <a:extLst>
+              <a:ext uri="{FF2B5EF4-FFF2-40B4-BE49-F238E27FC236}">
+                <a16:creationId xmlns:a16="http://schemas.microsoft.com/office/drawing/2014/main" id="{024ACE53-04F0-4B6F-BCF8-7083A63F7FC7}"/>
+              </a:ext>
+            </a:extLst>
+          </p:cNvPr>
+          <p:cNvSpPr>
+            <a:spLocks noGrp="1"/>
+          </p:cNvSpPr>
+          <p:nvPr>
+            <p:ph type="title"/>
+          </p:nvPr>
+        </p:nvSpPr>
+        <p:spPr/>
+        <p:txBody>
+          <a:bodyPr/>
+          <a:lstStyle/>
+          <a:p>
+            <a:r>
+              <a:rPr lang="en-US" dirty="0"/>
+              <a:t>Algorithm for building filtration</a:t>
+            </a:r>
+          </a:p>
+        </p:txBody>
+      </p:sp>
+      <p:sp>
+        <p:nvSpPr>
+          <p:cNvPr id="3" name="Content Placeholder 2">
+            <a:extLst>
+              <a:ext uri="{FF2B5EF4-FFF2-40B4-BE49-F238E27FC236}">
+                <a16:creationId xmlns:a16="http://schemas.microsoft.com/office/drawing/2014/main" id="{BA0B2B35-D1C4-4D7F-88A0-26E6C1A5E7EB}"/>
+              </a:ext>
+            </a:extLst>
+          </p:cNvPr>
+          <p:cNvSpPr>
+            <a:spLocks noGrp="1"/>
+          </p:cNvSpPr>
+          <p:nvPr>
+            <p:ph idx="1"/>
+          </p:nvPr>
+        </p:nvSpPr>
+        <p:spPr/>
+        <p:txBody>
+          <a:bodyPr/>
+          <a:lstStyle/>
+          <a:p>
+            <a:endParaRPr lang="en-US"/>
+          </a:p>
+        </p:txBody>
+      </p:sp>
+    </p:spTree>
+    <p:extLst>
+      <p:ext uri="{BB962C8B-B14F-4D97-AF65-F5344CB8AC3E}">
+        <p14:creationId xmlns:p14="http://schemas.microsoft.com/office/powerpoint/2010/main" val="756716916"/>
+      </p:ext>
+    </p:extLst>
+  </p:cSld>
+  <p:clrMapOvr>
+    <a:masterClrMapping/>
+  </p:clrMapOvr>
+</p:sld>
+</file>
+
+<file path=ppt/slides/slide25.xml><?xml version="1.0" encoding="utf-8"?>
+<p:sld xmlns:a="http://schemas.openxmlformats.org/drawingml/2006/main" xmlns:r="http://schemas.openxmlformats.org/officeDocument/2006/relationships" xmlns:p="http://schemas.openxmlformats.org/presentationml/2006/main">
+  <p:cSld>
+    <p:spTree>
+      <p:nvGrpSpPr>
+        <p:cNvPr id="1" name=""/>
+        <p:cNvGrpSpPr/>
+        <p:nvPr/>
+      </p:nvGrpSpPr>
+      <p:grpSpPr>
+        <a:xfrm>
+          <a:off x="0" y="0"/>
+          <a:ext cx="0" cy="0"/>
+          <a:chOff x="0" y="0"/>
+          <a:chExt cx="0" cy="0"/>
+        </a:xfrm>
+      </p:grpSpPr>
+      <p:sp>
+        <p:nvSpPr>
+          <p:cNvPr id="2" name="Title 1">
+            <a:extLst>
+              <a:ext uri="{FF2B5EF4-FFF2-40B4-BE49-F238E27FC236}">
+                <a16:creationId xmlns:a16="http://schemas.microsoft.com/office/drawing/2014/main" id="{8A115A26-CB7C-4055-B457-D588BF758986}"/>
+              </a:ext>
+            </a:extLst>
+          </p:cNvPr>
+          <p:cNvSpPr>
+            <a:spLocks noGrp="1"/>
+          </p:cNvSpPr>
+          <p:nvPr>
+            <p:ph type="title"/>
+          </p:nvPr>
+        </p:nvSpPr>
+        <p:spPr/>
+        <p:txBody>
+          <a:bodyPr/>
+          <a:lstStyle/>
+          <a:p>
+            <a:r>
+              <a:rPr lang="en-US" dirty="0"/>
+              <a:t>Question: How stable is this?</a:t>
+            </a:r>
+          </a:p>
+        </p:txBody>
+      </p:sp>
+      <p:sp>
+        <p:nvSpPr>
+          <p:cNvPr id="3" name="Content Placeholder 2">
+            <a:extLst>
+              <a:ext uri="{FF2B5EF4-FFF2-40B4-BE49-F238E27FC236}">
+                <a16:creationId xmlns:a16="http://schemas.microsoft.com/office/drawing/2014/main" id="{9D9979C6-DA39-4DBB-85C6-E6F4013E1F09}"/>
+              </a:ext>
+            </a:extLst>
+          </p:cNvPr>
+          <p:cNvSpPr>
+            <a:spLocks noGrp="1"/>
+          </p:cNvSpPr>
+          <p:nvPr>
+            <p:ph idx="1"/>
+          </p:nvPr>
+        </p:nvSpPr>
+        <p:spPr/>
+        <p:txBody>
+          <a:bodyPr/>
+          <a:lstStyle/>
+          <a:p>
+            <a:endParaRPr lang="en-US"/>
+          </a:p>
+        </p:txBody>
+      </p:sp>
+    </p:spTree>
+    <p:extLst>
+      <p:ext uri="{BB962C8B-B14F-4D97-AF65-F5344CB8AC3E}">
+        <p14:creationId xmlns:p14="http://schemas.microsoft.com/office/powerpoint/2010/main" val="2029857642"/>
+      </p:ext>
+    </p:extLst>
+  </p:cSld>
+  <p:clrMapOvr>
+    <a:masterClrMapping/>
+  </p:clrMapOvr>
+</p:sld>
+</file>
+
+<file path=ppt/slides/slide26.xml><?xml version="1.0" encoding="utf-8"?>
+<p:sld xmlns:a="http://schemas.openxmlformats.org/drawingml/2006/main" xmlns:r="http://schemas.openxmlformats.org/officeDocument/2006/relationships" xmlns:p="http://schemas.openxmlformats.org/presentationml/2006/main">
+  <p:cSld>
+    <p:spTree>
+      <p:nvGrpSpPr>
+        <p:cNvPr id="1" name=""/>
+        <p:cNvGrpSpPr/>
+        <p:nvPr/>
+      </p:nvGrpSpPr>
+      <p:grpSpPr>
+        <a:xfrm>
+          <a:off x="0" y="0"/>
+          <a:ext cx="0" cy="0"/>
+          <a:chOff x="0" y="0"/>
+          <a:chExt cx="0" cy="0"/>
+        </a:xfrm>
+      </p:grpSpPr>
+      <p:sp>
+        <p:nvSpPr>
+          <p:cNvPr id="2" name="Title 1">
+            <a:extLst>
+              <a:ext uri="{FF2B5EF4-FFF2-40B4-BE49-F238E27FC236}">
+                <a16:creationId xmlns:a16="http://schemas.microsoft.com/office/drawing/2014/main" id="{C13CD0FD-509D-47E1-B4BE-351E1A549810}"/>
+              </a:ext>
+            </a:extLst>
+          </p:cNvPr>
+          <p:cNvSpPr>
+            <a:spLocks noGrp="1"/>
+          </p:cNvSpPr>
+          <p:nvPr>
+            <p:ph type="title"/>
+          </p:nvPr>
+        </p:nvSpPr>
+        <p:spPr/>
+        <p:txBody>
+          <a:bodyPr/>
+          <a:lstStyle/>
+          <a:p>
+            <a:r>
+              <a:rPr lang="en-US" dirty="0"/>
+              <a:t>Visual 4 </a:t>
+            </a:r>
+            <a:r>
+              <a:rPr lang="en-US" dirty="0" err="1"/>
+              <a:t>pt</a:t>
+            </a:r>
+            <a:r>
+              <a:rPr lang="en-US" dirty="0"/>
+              <a:t> example of instability</a:t>
+            </a:r>
+          </a:p>
+        </p:txBody>
+      </p:sp>
+      <p:sp>
+        <p:nvSpPr>
+          <p:cNvPr id="3" name="Content Placeholder 2">
+            <a:extLst>
+              <a:ext uri="{FF2B5EF4-FFF2-40B4-BE49-F238E27FC236}">
+                <a16:creationId xmlns:a16="http://schemas.microsoft.com/office/drawing/2014/main" id="{98849576-A238-4663-8266-C764564F0A17}"/>
+              </a:ext>
+            </a:extLst>
+          </p:cNvPr>
+          <p:cNvSpPr>
+            <a:spLocks noGrp="1"/>
+          </p:cNvSpPr>
+          <p:nvPr>
+            <p:ph idx="1"/>
+          </p:nvPr>
+        </p:nvSpPr>
+        <p:spPr/>
+        <p:txBody>
+          <a:bodyPr/>
+          <a:lstStyle/>
+          <a:p>
+            <a:endParaRPr lang="en-US"/>
+          </a:p>
+        </p:txBody>
+      </p:sp>
+    </p:spTree>
+    <p:extLst>
+      <p:ext uri="{BB962C8B-B14F-4D97-AF65-F5344CB8AC3E}">
+        <p14:creationId xmlns:p14="http://schemas.microsoft.com/office/powerpoint/2010/main" val="133152898"/>
+      </p:ext>
+    </p:extLst>
+  </p:cSld>
+  <p:clrMapOvr>
+    <a:masterClrMapping/>
+  </p:clrMapOvr>
+</p:sld>
+</file>
+
+<file path=ppt/slides/slide27.xml><?xml version="1.0" encoding="utf-8"?>
+<p:sld xmlns:a="http://schemas.openxmlformats.org/drawingml/2006/main" xmlns:r="http://schemas.openxmlformats.org/officeDocument/2006/relationships" xmlns:p="http://schemas.openxmlformats.org/presentationml/2006/main">
+  <p:cSld>
+    <p:spTree>
+      <p:nvGrpSpPr>
+        <p:cNvPr id="1" name=""/>
+        <p:cNvGrpSpPr/>
+        <p:nvPr/>
+      </p:nvGrpSpPr>
+      <p:grpSpPr>
+        <a:xfrm>
+          <a:off x="0" y="0"/>
+          <a:ext cx="0" cy="0"/>
+          <a:chOff x="0" y="0"/>
+          <a:chExt cx="0" cy="0"/>
+        </a:xfrm>
+      </p:grpSpPr>
+      <p:sp>
+        <p:nvSpPr>
+          <p:cNvPr id="2" name="Title 1">
+            <a:extLst>
+              <a:ext uri="{FF2B5EF4-FFF2-40B4-BE49-F238E27FC236}">
+                <a16:creationId xmlns:a16="http://schemas.microsoft.com/office/drawing/2014/main" id="{178EDCEF-3746-43FB-AAD9-E46F3941A208}"/>
+              </a:ext>
+            </a:extLst>
+          </p:cNvPr>
+          <p:cNvSpPr>
+            <a:spLocks noGrp="1"/>
+          </p:cNvSpPr>
+          <p:nvPr>
+            <p:ph type="title"/>
+          </p:nvPr>
+        </p:nvSpPr>
+        <p:spPr/>
+        <p:txBody>
+          <a:bodyPr/>
+          <a:lstStyle/>
+          <a:p>
+            <a:r>
+              <a:rPr lang="en-US" dirty="0"/>
+              <a:t>Conditions that guarantee stability</a:t>
+            </a:r>
+          </a:p>
+        </p:txBody>
+      </p:sp>
+      <p:sp>
+        <p:nvSpPr>
+          <p:cNvPr id="3" name="Content Placeholder 2">
+            <a:extLst>
+              <a:ext uri="{FF2B5EF4-FFF2-40B4-BE49-F238E27FC236}">
+                <a16:creationId xmlns:a16="http://schemas.microsoft.com/office/drawing/2014/main" id="{2E68640C-A4A5-4EBA-9BC6-BCB1AD6D1EFC}"/>
+              </a:ext>
+            </a:extLst>
+          </p:cNvPr>
+          <p:cNvSpPr>
+            <a:spLocks noGrp="1"/>
+          </p:cNvSpPr>
+          <p:nvPr>
+            <p:ph idx="1"/>
+          </p:nvPr>
+        </p:nvSpPr>
+        <p:spPr/>
+        <p:txBody>
+          <a:bodyPr/>
+          <a:lstStyle/>
+          <a:p>
+            <a:endParaRPr lang="en-US"/>
+          </a:p>
+        </p:txBody>
+      </p:sp>
+    </p:spTree>
+    <p:extLst>
+      <p:ext uri="{BB962C8B-B14F-4D97-AF65-F5344CB8AC3E}">
+        <p14:creationId xmlns:p14="http://schemas.microsoft.com/office/powerpoint/2010/main" val="2232611828"/>
+      </p:ext>
+    </p:extLst>
+  </p:cSld>
+  <p:clrMapOvr>
+    <a:masterClrMapping/>
+  </p:clrMapOvr>
+</p:sld>
+</file>
+
+<file path=ppt/slides/slide28.xml><?xml version="1.0" encoding="utf-8"?>
+<p:sld xmlns:a="http://schemas.openxmlformats.org/drawingml/2006/main" xmlns:r="http://schemas.openxmlformats.org/officeDocument/2006/relationships" xmlns:p="http://schemas.openxmlformats.org/presentationml/2006/main">
+  <p:cSld>
+    <p:spTree>
+      <p:nvGrpSpPr>
+        <p:cNvPr id="1" name=""/>
+        <p:cNvGrpSpPr/>
+        <p:nvPr/>
+      </p:nvGrpSpPr>
+      <p:grpSpPr>
+        <a:xfrm>
+          <a:off x="0" y="0"/>
+          <a:ext cx="0" cy="0"/>
+          <a:chOff x="0" y="0"/>
+          <a:chExt cx="0" cy="0"/>
+        </a:xfrm>
+      </p:grpSpPr>
+      <p:sp>
+        <p:nvSpPr>
+          <p:cNvPr id="2" name="Title 1">
+            <a:extLst>
+              <a:ext uri="{FF2B5EF4-FFF2-40B4-BE49-F238E27FC236}">
+                <a16:creationId xmlns:a16="http://schemas.microsoft.com/office/drawing/2014/main" id="{8BFB6EC9-B6DA-47DC-9A79-1FB3438E71A1}"/>
+              </a:ext>
+            </a:extLst>
+          </p:cNvPr>
+          <p:cNvSpPr>
+            <a:spLocks noGrp="1"/>
+          </p:cNvSpPr>
+          <p:nvPr>
+            <p:ph type="title"/>
+          </p:nvPr>
+        </p:nvSpPr>
+        <p:spPr/>
+        <p:txBody>
+          <a:bodyPr/>
+          <a:lstStyle/>
+          <a:p>
+            <a:r>
+              <a:rPr lang="en-US" dirty="0"/>
+              <a:t>Maintain Delaunay Triangulation!</a:t>
+            </a:r>
+          </a:p>
+        </p:txBody>
+      </p:sp>
+      <p:sp>
+        <p:nvSpPr>
+          <p:cNvPr id="3" name="Content Placeholder 2">
+            <a:extLst>
+              <a:ext uri="{FF2B5EF4-FFF2-40B4-BE49-F238E27FC236}">
+                <a16:creationId xmlns:a16="http://schemas.microsoft.com/office/drawing/2014/main" id="{F54AACCD-C6A8-4F2D-91BB-5F3CB3002FFE}"/>
+              </a:ext>
+            </a:extLst>
+          </p:cNvPr>
+          <p:cNvSpPr>
+            <a:spLocks noGrp="1"/>
+          </p:cNvSpPr>
+          <p:nvPr>
+            <p:ph idx="1"/>
+          </p:nvPr>
+        </p:nvSpPr>
+        <p:spPr/>
+        <p:txBody>
+          <a:bodyPr/>
+          <a:lstStyle/>
+          <a:p>
+            <a:endParaRPr lang="en-US"/>
+          </a:p>
+        </p:txBody>
+      </p:sp>
+    </p:spTree>
+    <p:extLst>
+      <p:ext uri="{BB962C8B-B14F-4D97-AF65-F5344CB8AC3E}">
+        <p14:creationId xmlns:p14="http://schemas.microsoft.com/office/powerpoint/2010/main" val="1645593733"/>
+      </p:ext>
+    </p:extLst>
+  </p:cSld>
+  <p:clrMapOvr>
+    <a:masterClrMapping/>
+  </p:clrMapOvr>
+</p:sld>
+</file>
+
+<file path=ppt/slides/slide29.xml><?xml version="1.0" encoding="utf-8"?>
+<p:sld xmlns:a="http://schemas.openxmlformats.org/drawingml/2006/main" xmlns:r="http://schemas.openxmlformats.org/officeDocument/2006/relationships" xmlns:p="http://schemas.openxmlformats.org/presentationml/2006/main">
+  <p:cSld>
+    <p:spTree>
+      <p:nvGrpSpPr>
+        <p:cNvPr id="1" name=""/>
+        <p:cNvGrpSpPr/>
+        <p:nvPr/>
+      </p:nvGrpSpPr>
+      <p:grpSpPr>
+        <a:xfrm>
+          <a:off x="0" y="0"/>
+          <a:ext cx="0" cy="0"/>
+          <a:chOff x="0" y="0"/>
+          <a:chExt cx="0" cy="0"/>
+        </a:xfrm>
+      </p:grpSpPr>
+      <p:sp>
+        <p:nvSpPr>
+          <p:cNvPr id="2" name="Title 1">
+            <a:extLst>
+              <a:ext uri="{FF2B5EF4-FFF2-40B4-BE49-F238E27FC236}">
+                <a16:creationId xmlns:a16="http://schemas.microsoft.com/office/drawing/2014/main" id="{13DA5E6E-6E39-4B50-8878-CD0F66F5680F}"/>
+              </a:ext>
+            </a:extLst>
+          </p:cNvPr>
+          <p:cNvSpPr>
+            <a:spLocks noGrp="1"/>
+          </p:cNvSpPr>
+          <p:nvPr>
+            <p:ph type="title"/>
+          </p:nvPr>
+        </p:nvSpPr>
+        <p:spPr/>
+        <p:txBody>
+          <a:bodyPr/>
+          <a:lstStyle/>
+          <a:p>
+            <a:r>
+              <a:rPr lang="en-US" dirty="0"/>
+              <a:t>Apply to real data sets</a:t>
+            </a:r>
+          </a:p>
+        </p:txBody>
+      </p:sp>
+      <p:sp>
+        <p:nvSpPr>
+          <p:cNvPr id="3" name="Content Placeholder 2">
+            <a:extLst>
+              <a:ext uri="{FF2B5EF4-FFF2-40B4-BE49-F238E27FC236}">
+                <a16:creationId xmlns:a16="http://schemas.microsoft.com/office/drawing/2014/main" id="{432D3808-57C2-41BA-9256-CB4C634FF576}"/>
+              </a:ext>
+            </a:extLst>
+          </p:cNvPr>
+          <p:cNvSpPr>
+            <a:spLocks noGrp="1"/>
+          </p:cNvSpPr>
+          <p:nvPr>
+            <p:ph idx="1"/>
+          </p:nvPr>
+        </p:nvSpPr>
+        <p:spPr/>
+        <p:txBody>
+          <a:bodyPr/>
+          <a:lstStyle/>
+          <a:p>
+            <a:endParaRPr lang="en-US"/>
+          </a:p>
+        </p:txBody>
+      </p:sp>
+    </p:spTree>
+    <p:extLst>
+      <p:ext uri="{BB962C8B-B14F-4D97-AF65-F5344CB8AC3E}">
+        <p14:creationId xmlns:p14="http://schemas.microsoft.com/office/powerpoint/2010/main" val="962025160"/>
       </p:ext>
     </p:extLst>
   </p:cSld>
@@ -3576,7 +5987,7 @@
           <p:cNvPr id="2" name="Title 1">
             <a:extLst>
               <a:ext uri="{FF2B5EF4-FFF2-40B4-BE49-F238E27FC236}">
-                <a16:creationId xmlns:a16="http://schemas.microsoft.com/office/drawing/2014/main" id="{55137019-DE07-4089-97B0-43F7563FF197}"/>
+                <a16:creationId xmlns:a16="http://schemas.microsoft.com/office/drawing/2014/main" id="{DFB26BAC-DFB0-4621-ABD8-C287C90FEA3D}"/>
               </a:ext>
             </a:extLst>
           </p:cNvPr>
@@ -3593,56 +6004,550 @@
           <a:lstStyle/>
           <a:p>
             <a:r>
-              <a:rPr lang="en-US" dirty="0"/>
-              <a:t>TDA Applications</a:t>
-            </a:r>
-          </a:p>
-        </p:txBody>
-      </p:sp>
-      <p:sp>
-        <p:nvSpPr>
-          <p:cNvPr id="3" name="Content Placeholder 2">
-            <a:extLst>
-              <a:ext uri="{FF2B5EF4-FFF2-40B4-BE49-F238E27FC236}">
-                <a16:creationId xmlns:a16="http://schemas.microsoft.com/office/drawing/2014/main" id="{C2AF8C81-4E7D-4C9E-9CA2-F3B907FDCBF3}"/>
-              </a:ext>
-            </a:extLst>
-          </p:cNvPr>
-          <p:cNvSpPr>
-            <a:spLocks noGrp="1"/>
-          </p:cNvSpPr>
+              <a:rPr lang="en-US" dirty="0" err="1"/>
+              <a:t>Datasaurus</a:t>
+            </a:r>
+            <a:endParaRPr lang="en-US" dirty="0"/>
+          </a:p>
+        </p:txBody>
+      </p:sp>
+      <p:pic>
+        <p:nvPicPr>
+          <p:cNvPr id="9" name="Content Placeholder 8" descr="Calendar&#10;&#10;Description automatically generated">
+            <a:extLst>
+              <a:ext uri="{FF2B5EF4-FFF2-40B4-BE49-F238E27FC236}">
+                <a16:creationId xmlns:a16="http://schemas.microsoft.com/office/drawing/2014/main" id="{503A5595-4F1D-493E-96BA-52DFCE10997C}"/>
+              </a:ext>
+            </a:extLst>
+          </p:cNvPr>
+          <p:cNvPicPr>
+            <a:picLocks noGrp="1" noChangeAspect="1"/>
+          </p:cNvPicPr>
           <p:nvPr>
             <p:ph idx="1"/>
           </p:nvPr>
-        </p:nvSpPr>
-        <p:spPr/>
-        <p:txBody>
-          <a:bodyPr/>
-          <a:lstStyle/>
-          <a:p>
-            <a:r>
-              <a:rPr lang="en-US" dirty="0"/>
-              <a:t>Breast cancer</a:t>
-            </a:r>
-          </a:p>
-          <a:p>
-            <a:r>
-              <a:rPr lang="en-US" dirty="0"/>
-              <a:t>Proteins</a:t>
-            </a:r>
-          </a:p>
-          <a:p>
-            <a:r>
-              <a:rPr lang="en-US" dirty="0"/>
-              <a:t>Etc.</a:t>
-            </a:r>
-          </a:p>
-        </p:txBody>
-      </p:sp>
+        </p:nvPicPr>
+        <p:blipFill>
+          <a:blip r:embed="rId3">
+            <a:extLst>
+              <a:ext uri="{28A0092B-C50C-407E-A947-70E740481C1C}">
+                <a14:useLocalDpi xmlns:a14="http://schemas.microsoft.com/office/drawing/2010/main" val="0"/>
+              </a:ext>
+            </a:extLst>
+          </a:blip>
+          <a:stretch>
+            <a:fillRect/>
+          </a:stretch>
+        </p:blipFill>
+        <p:spPr>
+          <a:xfrm>
+            <a:off x="1991881" y="1549052"/>
+            <a:ext cx="7076704" cy="4943823"/>
+          </a:xfrm>
+        </p:spPr>
+      </p:pic>
     </p:spTree>
     <p:extLst>
       <p:ext uri="{BB962C8B-B14F-4D97-AF65-F5344CB8AC3E}">
-        <p14:creationId xmlns:p14="http://schemas.microsoft.com/office/powerpoint/2010/main" val="3541087401"/>
+        <p14:creationId xmlns:p14="http://schemas.microsoft.com/office/powerpoint/2010/main" val="2158979979"/>
+      </p:ext>
+    </p:extLst>
+  </p:cSld>
+  <p:clrMapOvr>
+    <a:masterClrMapping/>
+  </p:clrMapOvr>
+</p:sld>
+</file>
+
+<file path=ppt/slides/slide30.xml><?xml version="1.0" encoding="utf-8"?>
+<p:sld xmlns:a="http://schemas.openxmlformats.org/drawingml/2006/main" xmlns:r="http://schemas.openxmlformats.org/officeDocument/2006/relationships" xmlns:p="http://schemas.openxmlformats.org/presentationml/2006/main">
+  <p:cSld>
+    <p:spTree>
+      <p:nvGrpSpPr>
+        <p:cNvPr id="1" name=""/>
+        <p:cNvGrpSpPr/>
+        <p:nvPr/>
+      </p:nvGrpSpPr>
+      <p:grpSpPr>
+        <a:xfrm>
+          <a:off x="0" y="0"/>
+          <a:ext cx="0" cy="0"/>
+          <a:chOff x="0" y="0"/>
+          <a:chExt cx="0" cy="0"/>
+        </a:xfrm>
+      </p:grpSpPr>
+      <p:sp>
+        <p:nvSpPr>
+          <p:cNvPr id="2" name="Title 1">
+            <a:extLst>
+              <a:ext uri="{FF2B5EF4-FFF2-40B4-BE49-F238E27FC236}">
+                <a16:creationId xmlns:a16="http://schemas.microsoft.com/office/drawing/2014/main" id="{851ADC9A-FA13-4DC1-9676-76D7A1B15484}"/>
+              </a:ext>
+            </a:extLst>
+          </p:cNvPr>
+          <p:cNvSpPr>
+            <a:spLocks noGrp="1"/>
+          </p:cNvSpPr>
+          <p:nvPr>
+            <p:ph type="title"/>
+          </p:nvPr>
+        </p:nvSpPr>
+        <p:spPr/>
+        <p:txBody>
+          <a:bodyPr/>
+          <a:lstStyle/>
+          <a:p>
+            <a:r>
+              <a:rPr lang="en-US" dirty="0"/>
+              <a:t>Applications in ML</a:t>
+            </a:r>
+          </a:p>
+        </p:txBody>
+      </p:sp>
+      <p:sp>
+        <p:nvSpPr>
+          <p:cNvPr id="3" name="Content Placeholder 2">
+            <a:extLst>
+              <a:ext uri="{FF2B5EF4-FFF2-40B4-BE49-F238E27FC236}">
+                <a16:creationId xmlns:a16="http://schemas.microsoft.com/office/drawing/2014/main" id="{77E35179-3271-4E04-B4A9-E712A3091082}"/>
+              </a:ext>
+            </a:extLst>
+          </p:cNvPr>
+          <p:cNvSpPr>
+            <a:spLocks noGrp="1"/>
+          </p:cNvSpPr>
+          <p:nvPr>
+            <p:ph idx="1"/>
+          </p:nvPr>
+        </p:nvSpPr>
+        <p:spPr/>
+        <p:txBody>
+          <a:bodyPr/>
+          <a:lstStyle/>
+          <a:p>
+            <a:endParaRPr lang="en-US"/>
+          </a:p>
+        </p:txBody>
+      </p:sp>
+    </p:spTree>
+    <p:extLst>
+      <p:ext uri="{BB962C8B-B14F-4D97-AF65-F5344CB8AC3E}">
+        <p14:creationId xmlns:p14="http://schemas.microsoft.com/office/powerpoint/2010/main" val="3558651374"/>
+      </p:ext>
+    </p:extLst>
+  </p:cSld>
+  <p:clrMapOvr>
+    <a:masterClrMapping/>
+  </p:clrMapOvr>
+</p:sld>
+</file>
+
+<file path=ppt/slides/slide31.xml><?xml version="1.0" encoding="utf-8"?>
+<p:sld xmlns:a="http://schemas.openxmlformats.org/drawingml/2006/main" xmlns:r="http://schemas.openxmlformats.org/officeDocument/2006/relationships" xmlns:p="http://schemas.openxmlformats.org/presentationml/2006/main">
+  <p:cSld>
+    <p:spTree>
+      <p:nvGrpSpPr>
+        <p:cNvPr id="1" name=""/>
+        <p:cNvGrpSpPr/>
+        <p:nvPr/>
+      </p:nvGrpSpPr>
+      <p:grpSpPr>
+        <a:xfrm>
+          <a:off x="0" y="0"/>
+          <a:ext cx="0" cy="0"/>
+          <a:chOff x="0" y="0"/>
+          <a:chExt cx="0" cy="0"/>
+        </a:xfrm>
+      </p:grpSpPr>
+      <p:sp>
+        <p:nvSpPr>
+          <p:cNvPr id="2" name="Title 1">
+            <a:extLst>
+              <a:ext uri="{FF2B5EF4-FFF2-40B4-BE49-F238E27FC236}">
+                <a16:creationId xmlns:a16="http://schemas.microsoft.com/office/drawing/2014/main" id="{880A4F1F-FDBB-45CF-B2B9-CBF1BA50512A}"/>
+              </a:ext>
+            </a:extLst>
+          </p:cNvPr>
+          <p:cNvSpPr>
+            <a:spLocks noGrp="1"/>
+          </p:cNvSpPr>
+          <p:nvPr>
+            <p:ph type="title"/>
+          </p:nvPr>
+        </p:nvSpPr>
+        <p:spPr/>
+        <p:txBody>
+          <a:bodyPr/>
+          <a:lstStyle/>
+          <a:p>
+            <a:r>
+              <a:rPr lang="en-US" dirty="0"/>
+              <a:t>Proving stability for other TDA methods</a:t>
+            </a:r>
+          </a:p>
+        </p:txBody>
+      </p:sp>
+      <p:sp>
+        <p:nvSpPr>
+          <p:cNvPr id="3" name="Content Placeholder 2">
+            <a:extLst>
+              <a:ext uri="{FF2B5EF4-FFF2-40B4-BE49-F238E27FC236}">
+                <a16:creationId xmlns:a16="http://schemas.microsoft.com/office/drawing/2014/main" id="{862CEE77-E7F6-43F9-AC3E-6399465F8155}"/>
+              </a:ext>
+            </a:extLst>
+          </p:cNvPr>
+          <p:cNvSpPr>
+            <a:spLocks noGrp="1"/>
+          </p:cNvSpPr>
+          <p:nvPr>
+            <p:ph idx="1"/>
+          </p:nvPr>
+        </p:nvSpPr>
+        <p:spPr/>
+        <p:txBody>
+          <a:bodyPr/>
+          <a:lstStyle/>
+          <a:p>
+            <a:endParaRPr lang="en-US"/>
+          </a:p>
+        </p:txBody>
+      </p:sp>
+    </p:spTree>
+    <p:extLst>
+      <p:ext uri="{BB962C8B-B14F-4D97-AF65-F5344CB8AC3E}">
+        <p14:creationId xmlns:p14="http://schemas.microsoft.com/office/powerpoint/2010/main" val="1441298563"/>
+      </p:ext>
+    </p:extLst>
+  </p:cSld>
+  <p:clrMapOvr>
+    <a:masterClrMapping/>
+  </p:clrMapOvr>
+</p:sld>
+</file>
+
+<file path=ppt/slides/slide32.xml><?xml version="1.0" encoding="utf-8"?>
+<p:sld xmlns:a="http://schemas.openxmlformats.org/drawingml/2006/main" xmlns:r="http://schemas.openxmlformats.org/officeDocument/2006/relationships" xmlns:p="http://schemas.openxmlformats.org/presentationml/2006/main">
+  <p:cSld>
+    <p:spTree>
+      <p:nvGrpSpPr>
+        <p:cNvPr id="1" name=""/>
+        <p:cNvGrpSpPr/>
+        <p:nvPr/>
+      </p:nvGrpSpPr>
+      <p:grpSpPr>
+        <a:xfrm>
+          <a:off x="0" y="0"/>
+          <a:ext cx="0" cy="0"/>
+          <a:chOff x="0" y="0"/>
+          <a:chExt cx="0" cy="0"/>
+        </a:xfrm>
+      </p:grpSpPr>
+      <p:sp>
+        <p:nvSpPr>
+          <p:cNvPr id="2" name="Title 1">
+            <a:extLst>
+              <a:ext uri="{FF2B5EF4-FFF2-40B4-BE49-F238E27FC236}">
+                <a16:creationId xmlns:a16="http://schemas.microsoft.com/office/drawing/2014/main" id="{801553F7-0929-48D2-971C-524E6182617D}"/>
+              </a:ext>
+            </a:extLst>
+          </p:cNvPr>
+          <p:cNvSpPr>
+            <a:spLocks noGrp="1"/>
+          </p:cNvSpPr>
+          <p:nvPr>
+            <p:ph type="title"/>
+          </p:nvPr>
+        </p:nvSpPr>
+        <p:spPr/>
+        <p:txBody>
+          <a:bodyPr/>
+          <a:lstStyle/>
+          <a:p>
+            <a:r>
+              <a:rPr lang="en-US" dirty="0"/>
+              <a:t>Francis Motta</a:t>
+            </a:r>
+          </a:p>
+        </p:txBody>
+      </p:sp>
+      <p:sp>
+        <p:nvSpPr>
+          <p:cNvPr id="3" name="Content Placeholder 2">
+            <a:extLst>
+              <a:ext uri="{FF2B5EF4-FFF2-40B4-BE49-F238E27FC236}">
+                <a16:creationId xmlns:a16="http://schemas.microsoft.com/office/drawing/2014/main" id="{52492C27-F276-4A4F-9260-C3B4756E2526}"/>
+              </a:ext>
+            </a:extLst>
+          </p:cNvPr>
+          <p:cNvSpPr>
+            <a:spLocks noGrp="1"/>
+          </p:cNvSpPr>
+          <p:nvPr>
+            <p:ph idx="1"/>
+          </p:nvPr>
+        </p:nvSpPr>
+        <p:spPr/>
+        <p:txBody>
+          <a:bodyPr/>
+          <a:lstStyle/>
+          <a:p>
+            <a:endParaRPr lang="en-US"/>
+          </a:p>
+        </p:txBody>
+      </p:sp>
+    </p:spTree>
+    <p:extLst>
+      <p:ext uri="{BB962C8B-B14F-4D97-AF65-F5344CB8AC3E}">
+        <p14:creationId xmlns:p14="http://schemas.microsoft.com/office/powerpoint/2010/main" val="818815550"/>
+      </p:ext>
+    </p:extLst>
+  </p:cSld>
+  <p:clrMapOvr>
+    <a:masterClrMapping/>
+  </p:clrMapOvr>
+</p:sld>
+</file>
+
+<file path=ppt/slides/slide33.xml><?xml version="1.0" encoding="utf-8"?>
+<p:sld xmlns:a="http://schemas.openxmlformats.org/drawingml/2006/main" xmlns:r="http://schemas.openxmlformats.org/officeDocument/2006/relationships" xmlns:p="http://schemas.openxmlformats.org/presentationml/2006/main">
+  <p:cSld>
+    <p:spTree>
+      <p:nvGrpSpPr>
+        <p:cNvPr id="1" name=""/>
+        <p:cNvGrpSpPr/>
+        <p:nvPr/>
+      </p:nvGrpSpPr>
+      <p:grpSpPr>
+        <a:xfrm>
+          <a:off x="0" y="0"/>
+          <a:ext cx="0" cy="0"/>
+          <a:chOff x="0" y="0"/>
+          <a:chExt cx="0" cy="0"/>
+        </a:xfrm>
+      </p:grpSpPr>
+      <p:sp>
+        <p:nvSpPr>
+          <p:cNvPr id="2" name="Title 1">
+            <a:extLst>
+              <a:ext uri="{FF2B5EF4-FFF2-40B4-BE49-F238E27FC236}">
+                <a16:creationId xmlns:a16="http://schemas.microsoft.com/office/drawing/2014/main" id="{BDE33BFD-4CC3-4152-8479-CE47D9E3AB4F}"/>
+              </a:ext>
+            </a:extLst>
+          </p:cNvPr>
+          <p:cNvSpPr>
+            <a:spLocks noGrp="1"/>
+          </p:cNvSpPr>
+          <p:nvPr>
+            <p:ph type="title"/>
+          </p:nvPr>
+        </p:nvSpPr>
+        <p:spPr/>
+        <p:txBody>
+          <a:bodyPr/>
+          <a:lstStyle/>
+          <a:p>
+            <a:r>
+              <a:rPr lang="en-US" dirty="0"/>
+              <a:t>FAU</a:t>
+            </a:r>
+          </a:p>
+        </p:txBody>
+      </p:sp>
+      <p:sp>
+        <p:nvSpPr>
+          <p:cNvPr id="3" name="Content Placeholder 2">
+            <a:extLst>
+              <a:ext uri="{FF2B5EF4-FFF2-40B4-BE49-F238E27FC236}">
+                <a16:creationId xmlns:a16="http://schemas.microsoft.com/office/drawing/2014/main" id="{D39D639D-4B50-4C45-80C3-BACABBEC9F00}"/>
+              </a:ext>
+            </a:extLst>
+          </p:cNvPr>
+          <p:cNvSpPr>
+            <a:spLocks noGrp="1"/>
+          </p:cNvSpPr>
+          <p:nvPr>
+            <p:ph idx="1"/>
+          </p:nvPr>
+        </p:nvSpPr>
+        <p:spPr/>
+        <p:txBody>
+          <a:bodyPr/>
+          <a:lstStyle/>
+          <a:p>
+            <a:endParaRPr lang="en-US"/>
+          </a:p>
+        </p:txBody>
+      </p:sp>
+    </p:spTree>
+    <p:extLst>
+      <p:ext uri="{BB962C8B-B14F-4D97-AF65-F5344CB8AC3E}">
+        <p14:creationId xmlns:p14="http://schemas.microsoft.com/office/powerpoint/2010/main" val="4218175141"/>
+      </p:ext>
+    </p:extLst>
+  </p:cSld>
+  <p:clrMapOvr>
+    <a:masterClrMapping/>
+  </p:clrMapOvr>
+</p:sld>
+</file>
+
+<file path=ppt/slides/slide34.xml><?xml version="1.0" encoding="utf-8"?>
+<p:sld xmlns:a="http://schemas.openxmlformats.org/drawingml/2006/main" xmlns:r="http://schemas.openxmlformats.org/officeDocument/2006/relationships" xmlns:p="http://schemas.openxmlformats.org/presentationml/2006/main">
+  <p:cSld>
+    <p:spTree>
+      <p:nvGrpSpPr>
+        <p:cNvPr id="1" name=""/>
+        <p:cNvGrpSpPr/>
+        <p:nvPr/>
+      </p:nvGrpSpPr>
+      <p:grpSpPr>
+        <a:xfrm>
+          <a:off x="0" y="0"/>
+          <a:ext cx="0" cy="0"/>
+          <a:chOff x="0" y="0"/>
+          <a:chExt cx="0" cy="0"/>
+        </a:xfrm>
+      </p:grpSpPr>
+      <p:sp>
+        <p:nvSpPr>
+          <p:cNvPr id="2" name="Title 1">
+            <a:extLst>
+              <a:ext uri="{FF2B5EF4-FFF2-40B4-BE49-F238E27FC236}">
+                <a16:creationId xmlns:a16="http://schemas.microsoft.com/office/drawing/2014/main" id="{46DE1B55-B5F2-4B61-8B32-043EF8D05C55}"/>
+              </a:ext>
+            </a:extLst>
+          </p:cNvPr>
+          <p:cNvSpPr>
+            <a:spLocks noGrp="1"/>
+          </p:cNvSpPr>
+          <p:nvPr>
+            <p:ph type="title"/>
+          </p:nvPr>
+        </p:nvSpPr>
+        <p:spPr/>
+        <p:txBody>
+          <a:bodyPr/>
+          <a:lstStyle/>
+          <a:p>
+            <a:r>
+              <a:rPr lang="en-US" dirty="0"/>
+              <a:t>JMM</a:t>
+            </a:r>
+          </a:p>
+        </p:txBody>
+      </p:sp>
+      <p:sp>
+        <p:nvSpPr>
+          <p:cNvPr id="3" name="Content Placeholder 2">
+            <a:extLst>
+              <a:ext uri="{FF2B5EF4-FFF2-40B4-BE49-F238E27FC236}">
+                <a16:creationId xmlns:a16="http://schemas.microsoft.com/office/drawing/2014/main" id="{44A0649F-E4AD-457C-AA90-0B372DFEE36D}"/>
+              </a:ext>
+            </a:extLst>
+          </p:cNvPr>
+          <p:cNvSpPr>
+            <a:spLocks noGrp="1"/>
+          </p:cNvSpPr>
+          <p:nvPr>
+            <p:ph idx="1"/>
+          </p:nvPr>
+        </p:nvSpPr>
+        <p:spPr/>
+        <p:txBody>
+          <a:bodyPr/>
+          <a:lstStyle/>
+          <a:p>
+            <a:endParaRPr lang="en-US"/>
+          </a:p>
+        </p:txBody>
+      </p:sp>
+    </p:spTree>
+    <p:extLst>
+      <p:ext uri="{BB962C8B-B14F-4D97-AF65-F5344CB8AC3E}">
+        <p14:creationId xmlns:p14="http://schemas.microsoft.com/office/powerpoint/2010/main" val="3626715435"/>
+      </p:ext>
+    </p:extLst>
+  </p:cSld>
+  <p:clrMapOvr>
+    <a:masterClrMapping/>
+  </p:clrMapOvr>
+</p:sld>
+</file>
+
+<file path=ppt/slides/slide35.xml><?xml version="1.0" encoding="utf-8"?>
+<p:sld xmlns:a="http://schemas.openxmlformats.org/drawingml/2006/main" xmlns:r="http://schemas.openxmlformats.org/officeDocument/2006/relationships" xmlns:p="http://schemas.openxmlformats.org/presentationml/2006/main">
+  <p:cSld>
+    <p:spTree>
+      <p:nvGrpSpPr>
+        <p:cNvPr id="1" name=""/>
+        <p:cNvGrpSpPr/>
+        <p:nvPr/>
+      </p:nvGrpSpPr>
+      <p:grpSpPr>
+        <a:xfrm>
+          <a:off x="0" y="0"/>
+          <a:ext cx="0" cy="0"/>
+          <a:chOff x="0" y="0"/>
+          <a:chExt cx="0" cy="0"/>
+        </a:xfrm>
+      </p:grpSpPr>
+      <p:sp>
+        <p:nvSpPr>
+          <p:cNvPr id="2" name="Title 1">
+            <a:extLst>
+              <a:ext uri="{FF2B5EF4-FFF2-40B4-BE49-F238E27FC236}">
+                <a16:creationId xmlns:a16="http://schemas.microsoft.com/office/drawing/2014/main" id="{0FBB4124-ABC7-4414-99AA-F42328ABF176}"/>
+              </a:ext>
+            </a:extLst>
+          </p:cNvPr>
+          <p:cNvSpPr>
+            <a:spLocks noGrp="1"/>
+          </p:cNvSpPr>
+          <p:nvPr>
+            <p:ph type="title"/>
+          </p:nvPr>
+        </p:nvSpPr>
+        <p:spPr/>
+        <p:txBody>
+          <a:bodyPr/>
+          <a:lstStyle/>
+          <a:p>
+            <a:r>
+              <a:rPr lang="en-US" dirty="0"/>
+              <a:t>References</a:t>
+            </a:r>
+          </a:p>
+        </p:txBody>
+      </p:sp>
+      <p:sp>
+        <p:nvSpPr>
+          <p:cNvPr id="3" name="Content Placeholder 2">
+            <a:extLst>
+              <a:ext uri="{FF2B5EF4-FFF2-40B4-BE49-F238E27FC236}">
+                <a16:creationId xmlns:a16="http://schemas.microsoft.com/office/drawing/2014/main" id="{7BAB106A-300E-4217-9625-162F54F3D2ED}"/>
+              </a:ext>
+            </a:extLst>
+          </p:cNvPr>
+          <p:cNvSpPr>
+            <a:spLocks noGrp="1"/>
+          </p:cNvSpPr>
+          <p:nvPr>
+            <p:ph idx="1"/>
+          </p:nvPr>
+        </p:nvSpPr>
+        <p:spPr/>
+        <p:txBody>
+          <a:bodyPr/>
+          <a:lstStyle/>
+          <a:p>
+            <a:endParaRPr lang="en-US"/>
+          </a:p>
+        </p:txBody>
+      </p:sp>
+    </p:spTree>
+    <p:extLst>
+      <p:ext uri="{BB962C8B-B14F-4D97-AF65-F5344CB8AC3E}">
+        <p14:creationId xmlns:p14="http://schemas.microsoft.com/office/powerpoint/2010/main" val="4222339517"/>
       </p:ext>
     </p:extLst>
   </p:cSld>
@@ -3674,7 +6579,7 @@
           <p:cNvPr id="2" name="Title 1">
             <a:extLst>
               <a:ext uri="{FF2B5EF4-FFF2-40B4-BE49-F238E27FC236}">
-                <a16:creationId xmlns:a16="http://schemas.microsoft.com/office/drawing/2014/main" id="{47B5B05A-4223-46BE-86B7-3ED33C0CD917}"/>
+                <a16:creationId xmlns:a16="http://schemas.microsoft.com/office/drawing/2014/main" id="{AF2A0C7A-B977-4E12-938F-D860169DCB5E}"/>
               </a:ext>
             </a:extLst>
           </p:cNvPr>
@@ -3692,7 +6597,7 @@
           <a:p>
             <a:r>
               <a:rPr lang="en-US" dirty="0"/>
-              <a:t>Buzz words</a:t>
+              <a:t>Problem:</a:t>
             </a:r>
           </a:p>
         </p:txBody>
@@ -3702,7 +6607,7 @@
           <p:cNvPr id="3" name="Content Placeholder 2">
             <a:extLst>
               <a:ext uri="{FF2B5EF4-FFF2-40B4-BE49-F238E27FC236}">
-                <a16:creationId xmlns:a16="http://schemas.microsoft.com/office/drawing/2014/main" id="{A3DA9DE3-0510-4A41-B632-E27E8F164B9A}"/>
+                <a16:creationId xmlns:a16="http://schemas.microsoft.com/office/drawing/2014/main" id="{99FD0034-4810-4009-BD97-3EDFB9DFA129}"/>
               </a:ext>
             </a:extLst>
           </p:cNvPr>
@@ -3718,15 +6623,12 @@
           <a:bodyPr/>
           <a:lstStyle/>
           <a:p>
+            <a:pPr marL="0" indent="0">
+              <a:buNone/>
+            </a:pPr>
             <a:r>
               <a:rPr lang="en-US" dirty="0"/>
-              <a:t>Data/Point cloud</a:t>
-            </a:r>
-          </a:p>
-          <a:p>
-            <a:r>
-              <a:rPr lang="en-US" dirty="0"/>
-              <a:t>picture</a:t>
+              <a:t>What to do if visualization is not an option?</a:t>
             </a:r>
           </a:p>
         </p:txBody>
@@ -3734,7 +6636,7 @@
     </p:spTree>
     <p:extLst>
       <p:ext uri="{BB962C8B-B14F-4D97-AF65-F5344CB8AC3E}">
-        <p14:creationId xmlns:p14="http://schemas.microsoft.com/office/powerpoint/2010/main" val="1433351835"/>
+        <p14:creationId xmlns:p14="http://schemas.microsoft.com/office/powerpoint/2010/main" val="454046546"/>
       </p:ext>
     </p:extLst>
   </p:cSld>
@@ -3766,7 +6668,7 @@
           <p:cNvPr id="2" name="Title 1">
             <a:extLst>
               <a:ext uri="{FF2B5EF4-FFF2-40B4-BE49-F238E27FC236}">
-                <a16:creationId xmlns:a16="http://schemas.microsoft.com/office/drawing/2014/main" id="{47B5B05A-4223-46BE-86B7-3ED33C0CD917}"/>
+                <a16:creationId xmlns:a16="http://schemas.microsoft.com/office/drawing/2014/main" id="{37464E10-4814-4636-8D42-F66C4E18B609}"/>
               </a:ext>
             </a:extLst>
           </p:cNvPr>
@@ -3784,7 +6686,7 @@
           <a:p>
             <a:r>
               <a:rPr lang="en-US" dirty="0"/>
-              <a:t>Buzz words</a:t>
+              <a:t>TDA (Topological Data Analysis)</a:t>
             </a:r>
           </a:p>
         </p:txBody>
@@ -3794,7 +6696,7 @@
           <p:cNvPr id="3" name="Content Placeholder 2">
             <a:extLst>
               <a:ext uri="{FF2B5EF4-FFF2-40B4-BE49-F238E27FC236}">
-                <a16:creationId xmlns:a16="http://schemas.microsoft.com/office/drawing/2014/main" id="{A3DA9DE3-0510-4A41-B632-E27E8F164B9A}"/>
+                <a16:creationId xmlns:a16="http://schemas.microsoft.com/office/drawing/2014/main" id="{9C8628E1-FC9B-46E5-8FAC-C3633B5AE826}"/>
               </a:ext>
             </a:extLst>
           </p:cNvPr>
@@ -3805,20 +6707,19 @@
             <p:ph idx="1"/>
           </p:nvPr>
         </p:nvSpPr>
-        <p:spPr/>
+        <p:spPr>
+          <a:xfrm>
+            <a:off x="838200" y="1825625"/>
+            <a:ext cx="10515600" cy="953086"/>
+          </a:xfrm>
+        </p:spPr>
         <p:txBody>
           <a:bodyPr/>
           <a:lstStyle/>
           <a:p>
             <a:r>
               <a:rPr lang="en-US" dirty="0"/>
-              <a:t>Complex/Topology</a:t>
-            </a:r>
-          </a:p>
-          <a:p>
-            <a:r>
-              <a:rPr lang="en-US" dirty="0"/>
-              <a:t>Picture</a:t>
+              <a:t>Find the shape of the data</a:t>
             </a:r>
           </a:p>
         </p:txBody>
@@ -3826,7 +6727,7 @@
     </p:spTree>
     <p:extLst>
       <p:ext uri="{BB962C8B-B14F-4D97-AF65-F5344CB8AC3E}">
-        <p14:creationId xmlns:p14="http://schemas.microsoft.com/office/powerpoint/2010/main" val="3976551005"/>
+        <p14:creationId xmlns:p14="http://schemas.microsoft.com/office/powerpoint/2010/main" val="3834989462"/>
       </p:ext>
     </p:extLst>
   </p:cSld>
@@ -3858,7 +6759,7 @@
           <p:cNvPr id="2" name="Title 1">
             <a:extLst>
               <a:ext uri="{FF2B5EF4-FFF2-40B4-BE49-F238E27FC236}">
-                <a16:creationId xmlns:a16="http://schemas.microsoft.com/office/drawing/2014/main" id="{47B5B05A-4223-46BE-86B7-3ED33C0CD917}"/>
+                <a16:creationId xmlns:a16="http://schemas.microsoft.com/office/drawing/2014/main" id="{55137019-DE07-4089-97B0-43F7563FF197}"/>
               </a:ext>
             </a:extLst>
           </p:cNvPr>
@@ -3876,7 +6777,7 @@
           <a:p>
             <a:r>
               <a:rPr lang="en-US" dirty="0"/>
-              <a:t>Buzz words</a:t>
+              <a:t>TDA Applications</a:t>
             </a:r>
           </a:p>
         </p:txBody>
@@ -3886,7 +6787,7 @@
           <p:cNvPr id="3" name="Content Placeholder 2">
             <a:extLst>
               <a:ext uri="{FF2B5EF4-FFF2-40B4-BE49-F238E27FC236}">
-                <a16:creationId xmlns:a16="http://schemas.microsoft.com/office/drawing/2014/main" id="{A3DA9DE3-0510-4A41-B632-E27E8F164B9A}"/>
+                <a16:creationId xmlns:a16="http://schemas.microsoft.com/office/drawing/2014/main" id="{C2AF8C81-4E7D-4C9E-9CA2-F3B907FDCBF3}"/>
               </a:ext>
             </a:extLst>
           </p:cNvPr>
@@ -3904,21 +6805,45 @@
           <a:p>
             <a:r>
               <a:rPr lang="en-US" dirty="0"/>
-              <a:t>Persistence Diagram/Geometric Features</a:t>
-            </a:r>
+              <a:t>Protein folding video</a:t>
+            </a:r>
+          </a:p>
+          <a:p>
+            <a:r>
+              <a:rPr lang="en-US" dirty="0">
+                <a:hlinkClick r:id="rId3"/>
+              </a:rPr>
+              <a:t>Mobile data: https://epjdatascience.springeropen.com/articles/10.1140/epjds/s13688-015-0041-5</a:t>
+            </a:r>
+            <a:endParaRPr lang="en-US" dirty="0"/>
           </a:p>
           <a:p>
             <a:r>
               <a:rPr lang="en-US" dirty="0"/>
-              <a:t>Picture of PD with complex to show correspondence</a:t>
-            </a:r>
+              <a:t>Brain arteries:</a:t>
+            </a:r>
+          </a:p>
+          <a:p>
+            <a:pPr marL="0" indent="0">
+              <a:buNone/>
+            </a:pPr>
+            <a:r>
+              <a:rPr lang="en-US" dirty="0">
+                <a:hlinkClick r:id="rId4"/>
+              </a:rPr>
+              <a:t>https://cdr.lib.unc.edu/concern/parent/c534fv18f/file_sets/ft848x10p</a:t>
+            </a:r>
+            <a:endParaRPr lang="en-US" dirty="0"/>
+          </a:p>
+          <a:p>
+            <a:endParaRPr lang="en-US" dirty="0"/>
           </a:p>
         </p:txBody>
       </p:sp>
     </p:spTree>
     <p:extLst>
       <p:ext uri="{BB962C8B-B14F-4D97-AF65-F5344CB8AC3E}">
-        <p14:creationId xmlns:p14="http://schemas.microsoft.com/office/powerpoint/2010/main" val="336482058"/>
+        <p14:creationId xmlns:p14="http://schemas.microsoft.com/office/powerpoint/2010/main" val="3541087401"/>
       </p:ext>
     </p:extLst>
   </p:cSld>
@@ -3950,7 +6875,7 @@
           <p:cNvPr id="2" name="Title 1">
             <a:extLst>
               <a:ext uri="{FF2B5EF4-FFF2-40B4-BE49-F238E27FC236}">
-                <a16:creationId xmlns:a16="http://schemas.microsoft.com/office/drawing/2014/main" id="{E2A49108-552F-44DB-AD69-F71553B294DF}"/>
+                <a16:creationId xmlns:a16="http://schemas.microsoft.com/office/drawing/2014/main" id="{47B5B05A-4223-46BE-86B7-3ED33C0CD917}"/>
               </a:ext>
             </a:extLst>
           </p:cNvPr>
@@ -3968,7 +6893,7 @@
           <a:p>
             <a:r>
               <a:rPr lang="en-US" dirty="0"/>
-              <a:t>Pipeline</a:t>
+              <a:t>Buzz words</a:t>
             </a:r>
           </a:p>
         </p:txBody>
@@ -3978,7 +6903,7 @@
           <p:cNvPr id="3" name="Content Placeholder 2">
             <a:extLst>
               <a:ext uri="{FF2B5EF4-FFF2-40B4-BE49-F238E27FC236}">
-                <a16:creationId xmlns:a16="http://schemas.microsoft.com/office/drawing/2014/main" id="{4A7F540F-FCED-4EC7-AB4E-A1ED01FD36B8}"/>
+                <a16:creationId xmlns:a16="http://schemas.microsoft.com/office/drawing/2014/main" id="{A3DA9DE3-0510-4A41-B632-E27E8F164B9A}"/>
               </a:ext>
             </a:extLst>
           </p:cNvPr>
@@ -3996,7 +6921,13 @@
           <a:p>
             <a:r>
               <a:rPr lang="en-US" dirty="0"/>
-              <a:t>Data -&gt; Complex -&gt; Persistence Diagram -&gt; Interpretation</a:t>
+              <a:t>Data/Point cloud</a:t>
+            </a:r>
+          </a:p>
+          <a:p>
+            <a:r>
+              <a:rPr lang="en-US" dirty="0"/>
+              <a:t>picture</a:t>
             </a:r>
           </a:p>
         </p:txBody>
@@ -4004,7 +6935,191 @@
     </p:spTree>
     <p:extLst>
       <p:ext uri="{BB962C8B-B14F-4D97-AF65-F5344CB8AC3E}">
-        <p14:creationId xmlns:p14="http://schemas.microsoft.com/office/powerpoint/2010/main" val="3895794643"/>
+        <p14:creationId xmlns:p14="http://schemas.microsoft.com/office/powerpoint/2010/main" val="1433351835"/>
+      </p:ext>
+    </p:extLst>
+  </p:cSld>
+  <p:clrMapOvr>
+    <a:masterClrMapping/>
+  </p:clrMapOvr>
+</p:sld>
+</file>
+
+<file path=ppt/slides/slide8.xml><?xml version="1.0" encoding="utf-8"?>
+<p:sld xmlns:a="http://schemas.openxmlformats.org/drawingml/2006/main" xmlns:r="http://schemas.openxmlformats.org/officeDocument/2006/relationships" xmlns:p="http://schemas.openxmlformats.org/presentationml/2006/main">
+  <p:cSld>
+    <p:spTree>
+      <p:nvGrpSpPr>
+        <p:cNvPr id="1" name=""/>
+        <p:cNvGrpSpPr/>
+        <p:nvPr/>
+      </p:nvGrpSpPr>
+      <p:grpSpPr>
+        <a:xfrm>
+          <a:off x="0" y="0"/>
+          <a:ext cx="0" cy="0"/>
+          <a:chOff x="0" y="0"/>
+          <a:chExt cx="0" cy="0"/>
+        </a:xfrm>
+      </p:grpSpPr>
+      <p:sp>
+        <p:nvSpPr>
+          <p:cNvPr id="2" name="Title 1">
+            <a:extLst>
+              <a:ext uri="{FF2B5EF4-FFF2-40B4-BE49-F238E27FC236}">
+                <a16:creationId xmlns:a16="http://schemas.microsoft.com/office/drawing/2014/main" id="{47B5B05A-4223-46BE-86B7-3ED33C0CD917}"/>
+              </a:ext>
+            </a:extLst>
+          </p:cNvPr>
+          <p:cNvSpPr>
+            <a:spLocks noGrp="1"/>
+          </p:cNvSpPr>
+          <p:nvPr>
+            <p:ph type="title"/>
+          </p:nvPr>
+        </p:nvSpPr>
+        <p:spPr/>
+        <p:txBody>
+          <a:bodyPr/>
+          <a:lstStyle/>
+          <a:p>
+            <a:r>
+              <a:rPr lang="en-US" dirty="0"/>
+              <a:t>Buzz words</a:t>
+            </a:r>
+          </a:p>
+        </p:txBody>
+      </p:sp>
+      <p:sp>
+        <p:nvSpPr>
+          <p:cNvPr id="3" name="Content Placeholder 2">
+            <a:extLst>
+              <a:ext uri="{FF2B5EF4-FFF2-40B4-BE49-F238E27FC236}">
+                <a16:creationId xmlns:a16="http://schemas.microsoft.com/office/drawing/2014/main" id="{A3DA9DE3-0510-4A41-B632-E27E8F164B9A}"/>
+              </a:ext>
+            </a:extLst>
+          </p:cNvPr>
+          <p:cNvSpPr>
+            <a:spLocks noGrp="1"/>
+          </p:cNvSpPr>
+          <p:nvPr>
+            <p:ph idx="1"/>
+          </p:nvPr>
+        </p:nvSpPr>
+        <p:spPr/>
+        <p:txBody>
+          <a:bodyPr/>
+          <a:lstStyle/>
+          <a:p>
+            <a:r>
+              <a:rPr lang="en-US" dirty="0"/>
+              <a:t>Complex/Topology</a:t>
+            </a:r>
+          </a:p>
+          <a:p>
+            <a:r>
+              <a:rPr lang="en-US" dirty="0"/>
+              <a:t>Picture</a:t>
+            </a:r>
+          </a:p>
+        </p:txBody>
+      </p:sp>
+    </p:spTree>
+    <p:extLst>
+      <p:ext uri="{BB962C8B-B14F-4D97-AF65-F5344CB8AC3E}">
+        <p14:creationId xmlns:p14="http://schemas.microsoft.com/office/powerpoint/2010/main" val="3976551005"/>
+      </p:ext>
+    </p:extLst>
+  </p:cSld>
+  <p:clrMapOvr>
+    <a:masterClrMapping/>
+  </p:clrMapOvr>
+</p:sld>
+</file>
+
+<file path=ppt/slides/slide9.xml><?xml version="1.0" encoding="utf-8"?>
+<p:sld xmlns:a="http://schemas.openxmlformats.org/drawingml/2006/main" xmlns:r="http://schemas.openxmlformats.org/officeDocument/2006/relationships" xmlns:p="http://schemas.openxmlformats.org/presentationml/2006/main">
+  <p:cSld>
+    <p:spTree>
+      <p:nvGrpSpPr>
+        <p:cNvPr id="1" name=""/>
+        <p:cNvGrpSpPr/>
+        <p:nvPr/>
+      </p:nvGrpSpPr>
+      <p:grpSpPr>
+        <a:xfrm>
+          <a:off x="0" y="0"/>
+          <a:ext cx="0" cy="0"/>
+          <a:chOff x="0" y="0"/>
+          <a:chExt cx="0" cy="0"/>
+        </a:xfrm>
+      </p:grpSpPr>
+      <p:sp>
+        <p:nvSpPr>
+          <p:cNvPr id="2" name="Title 1">
+            <a:extLst>
+              <a:ext uri="{FF2B5EF4-FFF2-40B4-BE49-F238E27FC236}">
+                <a16:creationId xmlns:a16="http://schemas.microsoft.com/office/drawing/2014/main" id="{47B5B05A-4223-46BE-86B7-3ED33C0CD917}"/>
+              </a:ext>
+            </a:extLst>
+          </p:cNvPr>
+          <p:cNvSpPr>
+            <a:spLocks noGrp="1"/>
+          </p:cNvSpPr>
+          <p:nvPr>
+            <p:ph type="title"/>
+          </p:nvPr>
+        </p:nvSpPr>
+        <p:spPr/>
+        <p:txBody>
+          <a:bodyPr/>
+          <a:lstStyle/>
+          <a:p>
+            <a:r>
+              <a:rPr lang="en-US" dirty="0"/>
+              <a:t>Buzz words</a:t>
+            </a:r>
+          </a:p>
+        </p:txBody>
+      </p:sp>
+      <p:sp>
+        <p:nvSpPr>
+          <p:cNvPr id="3" name="Content Placeholder 2">
+            <a:extLst>
+              <a:ext uri="{FF2B5EF4-FFF2-40B4-BE49-F238E27FC236}">
+                <a16:creationId xmlns:a16="http://schemas.microsoft.com/office/drawing/2014/main" id="{A3DA9DE3-0510-4A41-B632-E27E8F164B9A}"/>
+              </a:ext>
+            </a:extLst>
+          </p:cNvPr>
+          <p:cNvSpPr>
+            <a:spLocks noGrp="1"/>
+          </p:cNvSpPr>
+          <p:nvPr>
+            <p:ph idx="1"/>
+          </p:nvPr>
+        </p:nvSpPr>
+        <p:spPr/>
+        <p:txBody>
+          <a:bodyPr/>
+          <a:lstStyle/>
+          <a:p>
+            <a:r>
+              <a:rPr lang="en-US" dirty="0"/>
+              <a:t>Persistence Diagram/Geometric Features</a:t>
+            </a:r>
+          </a:p>
+          <a:p>
+            <a:r>
+              <a:rPr lang="en-US" dirty="0"/>
+              <a:t>Picture of PD with complex to show correspondence</a:t>
+            </a:r>
+          </a:p>
+        </p:txBody>
+      </p:sp>
+    </p:spTree>
+    <p:extLst>
+      <p:ext uri="{BB962C8B-B14F-4D97-AF65-F5344CB8AC3E}">
+        <p14:creationId xmlns:p14="http://schemas.microsoft.com/office/powerpoint/2010/main" val="336482058"/>
       </p:ext>
     </p:extLst>
   </p:cSld>
@@ -4307,4 +7422,299 @@
     </a:ext>
   </a:extLst>
 </a:theme>
+</file>
+
+<file path=ppt/theme/theme2.xml><?xml version="1.0" encoding="utf-8"?>
+<a:theme xmlns:a="http://schemas.openxmlformats.org/drawingml/2006/main" name="Office Theme">
+  <a:themeElements>
+    <a:clrScheme name="Office">
+      <a:dk1>
+        <a:sysClr val="windowText" lastClr="000000"/>
+      </a:dk1>
+      <a:lt1>
+        <a:sysClr val="window" lastClr="FFFFFF"/>
+      </a:lt1>
+      <a:dk2>
+        <a:srgbClr val="44546A"/>
+      </a:dk2>
+      <a:lt2>
+        <a:srgbClr val="E7E6E6"/>
+      </a:lt2>
+      <a:accent1>
+        <a:srgbClr val="4472C4"/>
+      </a:accent1>
+      <a:accent2>
+        <a:srgbClr val="ED7D31"/>
+      </a:accent2>
+      <a:accent3>
+        <a:srgbClr val="A5A5A5"/>
+      </a:accent3>
+      <a:accent4>
+        <a:srgbClr val="FFC000"/>
+      </a:accent4>
+      <a:accent5>
+        <a:srgbClr val="5B9BD5"/>
+      </a:accent5>
+      <a:accent6>
+        <a:srgbClr val="70AD47"/>
+      </a:accent6>
+      <a:hlink>
+        <a:srgbClr val="0563C1"/>
+      </a:hlink>
+      <a:folHlink>
+        <a:srgbClr val="954F72"/>
+      </a:folHlink>
+    </a:clrScheme>
+    <a:fontScheme name="Office">
+      <a:majorFont>
+        <a:latin typeface="Calibri Light" panose="020F0302020204030204"/>
+        <a:ea typeface=""/>
+        <a:cs typeface=""/>
+        <a:font script="Jpan" typeface="游ゴシック Light"/>
+        <a:font script="Hang" typeface="맑은 고딕"/>
+        <a:font script="Hans" typeface="等线 Light"/>
+        <a:font script="Hant" typeface="新細明體"/>
+        <a:font script="Arab" typeface="Times New Roman"/>
+        <a:font script="Hebr" typeface="Times New Roman"/>
+        <a:font script="Thai" typeface="Angsana New"/>
+        <a:font script="Ethi" typeface="Nyala"/>
+        <a:font script="Beng" typeface="Vrinda"/>
+        <a:font script="Gujr" typeface="Shruti"/>
+        <a:font script="Khmr" typeface="MoolBoran"/>
+        <a:font script="Knda" typeface="Tunga"/>
+        <a:font script="Guru" typeface="Raavi"/>
+        <a:font script="Cans" typeface="Euphemia"/>
+        <a:font script="Cher" typeface="Plantagenet Cherokee"/>
+        <a:font script="Yiii" typeface="Microsoft Yi Baiti"/>
+        <a:font script="Tibt" typeface="Microsoft Himalaya"/>
+        <a:font script="Thaa" typeface="MV Boli"/>
+        <a:font script="Deva" typeface="Mangal"/>
+        <a:font script="Telu" typeface="Gautami"/>
+        <a:font script="Taml" typeface="Latha"/>
+        <a:font script="Syrc" typeface="Estrangelo Edessa"/>
+        <a:font script="Orya" typeface="Kalinga"/>
+        <a:font script="Mlym" typeface="Kartika"/>
+        <a:font script="Laoo" typeface="DokChampa"/>
+        <a:font script="Sinh" typeface="Iskoola Pota"/>
+        <a:font script="Mong" typeface="Mongolian Baiti"/>
+        <a:font script="Viet" typeface="Times New Roman"/>
+        <a:font script="Uigh" typeface="Microsoft Uighur"/>
+        <a:font script="Geor" typeface="Sylfaen"/>
+        <a:font script="Armn" typeface="Arial"/>
+        <a:font script="Bugi" typeface="Leelawadee UI"/>
+        <a:font script="Bopo" typeface="Microsoft JhengHei"/>
+        <a:font script="Java" typeface="Javanese Text"/>
+        <a:font script="Lisu" typeface="Segoe UI"/>
+        <a:font script="Mymr" typeface="Myanmar Text"/>
+        <a:font script="Nkoo" typeface="Ebrima"/>
+        <a:font script="Olck" typeface="Nirmala UI"/>
+        <a:font script="Osma" typeface="Ebrima"/>
+        <a:font script="Phag" typeface="Phagspa"/>
+        <a:font script="Syrn" typeface="Estrangelo Edessa"/>
+        <a:font script="Syrj" typeface="Estrangelo Edessa"/>
+        <a:font script="Syre" typeface="Estrangelo Edessa"/>
+        <a:font script="Sora" typeface="Nirmala UI"/>
+        <a:font script="Tale" typeface="Microsoft Tai Le"/>
+        <a:font script="Talu" typeface="Microsoft New Tai Lue"/>
+        <a:font script="Tfng" typeface="Ebrima"/>
+      </a:majorFont>
+      <a:minorFont>
+        <a:latin typeface="Calibri" panose="020F0502020204030204"/>
+        <a:ea typeface=""/>
+        <a:cs typeface=""/>
+        <a:font script="Jpan" typeface="游ゴシック"/>
+        <a:font script="Hang" typeface="맑은 고딕"/>
+        <a:font script="Hans" typeface="等线"/>
+        <a:font script="Hant" typeface="新細明體"/>
+        <a:font script="Arab" typeface="Arial"/>
+        <a:font script="Hebr" typeface="Arial"/>
+        <a:font script="Thai" typeface="Cordia New"/>
+        <a:font script="Ethi" typeface="Nyala"/>
+        <a:font script="Beng" typeface="Vrinda"/>
+        <a:font script="Gujr" typeface="Shruti"/>
+        <a:font script="Khmr" typeface="DaunPenh"/>
+        <a:font script="Knda" typeface="Tunga"/>
+        <a:font script="Guru" typeface="Raavi"/>
+        <a:font script="Cans" typeface="Euphemia"/>
+        <a:font script="Cher" typeface="Plantagenet Cherokee"/>
+        <a:font script="Yiii" typeface="Microsoft Yi Baiti"/>
+        <a:font script="Tibt" typeface="Microsoft Himalaya"/>
+        <a:font script="Thaa" typeface="MV Boli"/>
+        <a:font script="Deva" typeface="Mangal"/>
+        <a:font script="Telu" typeface="Gautami"/>
+        <a:font script="Taml" typeface="Latha"/>
+        <a:font script="Syrc" typeface="Estrangelo Edessa"/>
+        <a:font script="Orya" typeface="Kalinga"/>
+        <a:font script="Mlym" typeface="Kartika"/>
+        <a:font script="Laoo" typeface="DokChampa"/>
+        <a:font script="Sinh" typeface="Iskoola Pota"/>
+        <a:font script="Mong" typeface="Mongolian Baiti"/>
+        <a:font script="Viet" typeface="Arial"/>
+        <a:font script="Uigh" typeface="Microsoft Uighur"/>
+        <a:font script="Geor" typeface="Sylfaen"/>
+        <a:font script="Armn" typeface="Arial"/>
+        <a:font script="Bugi" typeface="Leelawadee UI"/>
+        <a:font script="Bopo" typeface="Microsoft JhengHei"/>
+        <a:font script="Java" typeface="Javanese Text"/>
+        <a:font script="Lisu" typeface="Segoe UI"/>
+        <a:font script="Mymr" typeface="Myanmar Text"/>
+        <a:font script="Nkoo" typeface="Ebrima"/>
+        <a:font script="Olck" typeface="Nirmala UI"/>
+        <a:font script="Osma" typeface="Ebrima"/>
+        <a:font script="Phag" typeface="Phagspa"/>
+        <a:font script="Syrn" typeface="Estrangelo Edessa"/>
+        <a:font script="Syrj" typeface="Estrangelo Edessa"/>
+        <a:font script="Syre" typeface="Estrangelo Edessa"/>
+        <a:font script="Sora" typeface="Nirmala UI"/>
+        <a:font script="Tale" typeface="Microsoft Tai Le"/>
+        <a:font script="Talu" typeface="Microsoft New Tai Lue"/>
+        <a:font script="Tfng" typeface="Ebrima"/>
+      </a:minorFont>
+    </a:fontScheme>
+    <a:fmtScheme name="Office">
+      <a:fillStyleLst>
+        <a:solidFill>
+          <a:schemeClr val="phClr"/>
+        </a:solidFill>
+        <a:gradFill rotWithShape="1">
+          <a:gsLst>
+            <a:gs pos="0">
+              <a:schemeClr val="phClr">
+                <a:lumMod val="110000"/>
+                <a:satMod val="105000"/>
+                <a:tint val="67000"/>
+              </a:schemeClr>
+            </a:gs>
+            <a:gs pos="50000">
+              <a:schemeClr val="phClr">
+                <a:lumMod val="105000"/>
+                <a:satMod val="103000"/>
+                <a:tint val="73000"/>
+              </a:schemeClr>
+            </a:gs>
+            <a:gs pos="100000">
+              <a:schemeClr val="phClr">
+                <a:lumMod val="105000"/>
+                <a:satMod val="109000"/>
+                <a:tint val="81000"/>
+              </a:schemeClr>
+            </a:gs>
+          </a:gsLst>
+          <a:lin ang="5400000" scaled="0"/>
+        </a:gradFill>
+        <a:gradFill rotWithShape="1">
+          <a:gsLst>
+            <a:gs pos="0">
+              <a:schemeClr val="phClr">
+                <a:satMod val="103000"/>
+                <a:lumMod val="102000"/>
+                <a:tint val="94000"/>
+              </a:schemeClr>
+            </a:gs>
+            <a:gs pos="50000">
+              <a:schemeClr val="phClr">
+                <a:satMod val="110000"/>
+                <a:lumMod val="100000"/>
+                <a:shade val="100000"/>
+              </a:schemeClr>
+            </a:gs>
+            <a:gs pos="100000">
+              <a:schemeClr val="phClr">
+                <a:lumMod val="99000"/>
+                <a:satMod val="120000"/>
+                <a:shade val="78000"/>
+              </a:schemeClr>
+            </a:gs>
+          </a:gsLst>
+          <a:lin ang="5400000" scaled="0"/>
+        </a:gradFill>
+      </a:fillStyleLst>
+      <a:lnStyleLst>
+        <a:ln w="6350" cap="flat" cmpd="sng" algn="ctr">
+          <a:solidFill>
+            <a:schemeClr val="phClr"/>
+          </a:solidFill>
+          <a:prstDash val="solid"/>
+          <a:miter lim="800000"/>
+        </a:ln>
+        <a:ln w="12700" cap="flat" cmpd="sng" algn="ctr">
+          <a:solidFill>
+            <a:schemeClr val="phClr"/>
+          </a:solidFill>
+          <a:prstDash val="solid"/>
+          <a:miter lim="800000"/>
+        </a:ln>
+        <a:ln w="19050" cap="flat" cmpd="sng" algn="ctr">
+          <a:solidFill>
+            <a:schemeClr val="phClr"/>
+          </a:solidFill>
+          <a:prstDash val="solid"/>
+          <a:miter lim="800000"/>
+        </a:ln>
+      </a:lnStyleLst>
+      <a:effectStyleLst>
+        <a:effectStyle>
+          <a:effectLst/>
+        </a:effectStyle>
+        <a:effectStyle>
+          <a:effectLst/>
+        </a:effectStyle>
+        <a:effectStyle>
+          <a:effectLst>
+            <a:outerShdw blurRad="57150" dist="19050" dir="5400000" algn="ctr" rotWithShape="0">
+              <a:srgbClr val="000000">
+                <a:alpha val="63000"/>
+              </a:srgbClr>
+            </a:outerShdw>
+          </a:effectLst>
+        </a:effectStyle>
+      </a:effectStyleLst>
+      <a:bgFillStyleLst>
+        <a:solidFill>
+          <a:schemeClr val="phClr"/>
+        </a:solidFill>
+        <a:solidFill>
+          <a:schemeClr val="phClr">
+            <a:tint val="95000"/>
+            <a:satMod val="170000"/>
+          </a:schemeClr>
+        </a:solidFill>
+        <a:gradFill rotWithShape="1">
+          <a:gsLst>
+            <a:gs pos="0">
+              <a:schemeClr val="phClr">
+                <a:tint val="93000"/>
+                <a:satMod val="150000"/>
+                <a:shade val="98000"/>
+                <a:lumMod val="102000"/>
+              </a:schemeClr>
+            </a:gs>
+            <a:gs pos="50000">
+              <a:schemeClr val="phClr">
+                <a:tint val="98000"/>
+                <a:satMod val="130000"/>
+                <a:shade val="90000"/>
+                <a:lumMod val="103000"/>
+              </a:schemeClr>
+            </a:gs>
+            <a:gs pos="100000">
+              <a:schemeClr val="phClr">
+                <a:shade val="63000"/>
+                <a:satMod val="120000"/>
+              </a:schemeClr>
+            </a:gs>
+          </a:gsLst>
+          <a:lin ang="5400000" scaled="0"/>
+        </a:gradFill>
+      </a:bgFillStyleLst>
+    </a:fmtScheme>
+  </a:themeElements>
+  <a:objectDefaults/>
+  <a:extraClrSchemeLst/>
+  <a:extLst>
+    <a:ext uri="{05A4C25C-085E-4340-85A3-A5531E510DB2}">
+      <thm15:themeFamily xmlns:thm15="http://schemas.microsoft.com/office/thememl/2012/main" name="Office Theme" id="{62F939B6-93AF-4DB8-9C6B-D6C7DFDC589F}" vid="{4A3C46E8-61CC-4603-A589-7422A47A8E4A}"/>
+    </a:ext>
+  </a:extLst>
+</a:theme>
 </file>
</xml_diff>